<commit_message>
Modified , almost completed
</commit_message>
<xml_diff>
--- a/Angular2Presentation.pptx
+++ b/Angular2Presentation.pptx
@@ -5,10 +5,10 @@
     <p:sldMasterId id="2147483648" r:id="rId1"/>
   </p:sldMasterIdLst>
   <p:notesMasterIdLst>
-    <p:notesMasterId r:id="rId42"/>
+    <p:notesMasterId r:id="rId79"/>
   </p:notesMasterIdLst>
   <p:handoutMasterIdLst>
-    <p:handoutMasterId r:id="rId43"/>
+    <p:handoutMasterId r:id="rId80"/>
   </p:handoutMasterIdLst>
   <p:sldIdLst>
     <p:sldId id="256" r:id="rId2"/>
@@ -47,10 +47,47 @@
     <p:sldId id="291" r:id="rId35"/>
     <p:sldId id="292" r:id="rId36"/>
     <p:sldId id="293" r:id="rId37"/>
-    <p:sldId id="294" r:id="rId38"/>
-    <p:sldId id="295" r:id="rId39"/>
-    <p:sldId id="296" r:id="rId40"/>
-    <p:sldId id="297" r:id="rId41"/>
+    <p:sldId id="298" r:id="rId38"/>
+    <p:sldId id="299" r:id="rId39"/>
+    <p:sldId id="295" r:id="rId40"/>
+    <p:sldId id="296" r:id="rId41"/>
+    <p:sldId id="310" r:id="rId42"/>
+    <p:sldId id="297" r:id="rId43"/>
+    <p:sldId id="300" r:id="rId44"/>
+    <p:sldId id="302" r:id="rId45"/>
+    <p:sldId id="303" r:id="rId46"/>
+    <p:sldId id="304" r:id="rId47"/>
+    <p:sldId id="311" r:id="rId48"/>
+    <p:sldId id="305" r:id="rId49"/>
+    <p:sldId id="306" r:id="rId50"/>
+    <p:sldId id="307" r:id="rId51"/>
+    <p:sldId id="312" r:id="rId52"/>
+    <p:sldId id="308" r:id="rId53"/>
+    <p:sldId id="316" r:id="rId54"/>
+    <p:sldId id="309" r:id="rId55"/>
+    <p:sldId id="313" r:id="rId56"/>
+    <p:sldId id="314" r:id="rId57"/>
+    <p:sldId id="315" r:id="rId58"/>
+    <p:sldId id="317" r:id="rId59"/>
+    <p:sldId id="318" r:id="rId60"/>
+    <p:sldId id="319" r:id="rId61"/>
+    <p:sldId id="320" r:id="rId62"/>
+    <p:sldId id="322" r:id="rId63"/>
+    <p:sldId id="323" r:id="rId64"/>
+    <p:sldId id="324" r:id="rId65"/>
+    <p:sldId id="325" r:id="rId66"/>
+    <p:sldId id="326" r:id="rId67"/>
+    <p:sldId id="328" r:id="rId68"/>
+    <p:sldId id="327" r:id="rId69"/>
+    <p:sldId id="329" r:id="rId70"/>
+    <p:sldId id="330" r:id="rId71"/>
+    <p:sldId id="331" r:id="rId72"/>
+    <p:sldId id="332" r:id="rId73"/>
+    <p:sldId id="333" r:id="rId74"/>
+    <p:sldId id="334" r:id="rId75"/>
+    <p:sldId id="335" r:id="rId76"/>
+    <p:sldId id="336" r:id="rId77"/>
+    <p:sldId id="337" r:id="rId78"/>
   </p:sldIdLst>
   <p:sldSz cx="12192000" cy="6858000"/>
   <p:notesSz cx="6858000" cy="9144000"/>
@@ -242,7 +279,7 @@
           <a:p>
             <a:fld id="{E4FD2236-6D9A-448E-8F3D-01837D37627A}" type="datetimeFigureOut">
               <a:rPr lang="en-IN" smtClean="0"/>
-              <a:t>14-12-2016</a:t>
+              <a:t>15-12-2016</a:t>
             </a:fld>
             <a:endParaRPr lang="en-IN"/>
           </a:p>
@@ -411,7 +448,7 @@
           <a:p>
             <a:fld id="{C13E07F0-85CA-479C-A573-2BA76BE3C8A6}" type="datetimeFigureOut">
               <a:rPr lang="en-IN" smtClean="0"/>
-              <a:t>14-12-2016</a:t>
+              <a:t>15-12-2016</a:t>
             </a:fld>
             <a:endParaRPr lang="en-IN"/>
           </a:p>
@@ -872,7 +909,7 @@
             <a:fld id="{B61BEF0D-F0BB-DE4B-95CE-6DB70DBA9567}" type="datetimeFigureOut">
               <a:rPr lang="en-US" dirty="0"/>
               <a:pPr/>
-              <a:t>12/14/2016</a:t>
+              <a:t>12/15/2016</a:t>
             </a:fld>
             <a:endParaRPr lang="en-US" dirty="0"/>
           </a:p>
@@ -1305,7 +1342,7 @@
             <a:fld id="{B61BEF0D-F0BB-DE4B-95CE-6DB70DBA9567}" type="datetimeFigureOut">
               <a:rPr lang="en-US" dirty="0"/>
               <a:pPr/>
-              <a:t>12/14/2016</a:t>
+              <a:t>12/15/2016</a:t>
             </a:fld>
             <a:endParaRPr lang="en-US" dirty="0"/>
           </a:p>
@@ -1552,7 +1589,7 @@
             <a:fld id="{B61BEF0D-F0BB-DE4B-95CE-6DB70DBA9567}" type="datetimeFigureOut">
               <a:rPr lang="en-US" dirty="0"/>
               <a:pPr/>
-              <a:t>12/14/2016</a:t>
+              <a:t>12/15/2016</a:t>
             </a:fld>
             <a:endParaRPr lang="en-US" dirty="0"/>
           </a:p>
@@ -1857,7 +1894,7 @@
             <a:fld id="{B61BEF0D-F0BB-DE4B-95CE-6DB70DBA9567}" type="datetimeFigureOut">
               <a:rPr lang="en-US" dirty="0"/>
               <a:pPr/>
-              <a:t>12/14/2016</a:t>
+              <a:t>12/15/2016</a:t>
             </a:fld>
             <a:endParaRPr lang="en-US" dirty="0"/>
           </a:p>
@@ -2172,7 +2209,7 @@
             <a:fld id="{B61BEF0D-F0BB-DE4B-95CE-6DB70DBA9567}" type="datetimeFigureOut">
               <a:rPr lang="en-US" dirty="0"/>
               <a:pPr/>
-              <a:t>12/14/2016</a:t>
+              <a:t>12/15/2016</a:t>
             </a:fld>
             <a:endParaRPr lang="en-US" dirty="0"/>
           </a:p>
@@ -2471,7 +2508,7 @@
             <a:fld id="{B61BEF0D-F0BB-DE4B-95CE-6DB70DBA9567}" type="datetimeFigureOut">
               <a:rPr lang="en-US" dirty="0"/>
               <a:pPr/>
-              <a:t>12/14/2016</a:t>
+              <a:t>12/15/2016</a:t>
             </a:fld>
             <a:endParaRPr lang="en-US" dirty="0"/>
           </a:p>
@@ -2835,7 +2872,7 @@
             <a:fld id="{B61BEF0D-F0BB-DE4B-95CE-6DB70DBA9567}" type="datetimeFigureOut">
               <a:rPr lang="en-US" dirty="0"/>
               <a:pPr/>
-              <a:t>12/14/2016</a:t>
+              <a:t>12/15/2016</a:t>
             </a:fld>
             <a:endParaRPr lang="en-US" dirty="0"/>
           </a:p>
@@ -3006,7 +3043,7 @@
             <a:fld id="{B61BEF0D-F0BB-DE4B-95CE-6DB70DBA9567}" type="datetimeFigureOut">
               <a:rPr lang="en-US" dirty="0"/>
               <a:pPr/>
-              <a:t>12/14/2016</a:t>
+              <a:t>12/15/2016</a:t>
             </a:fld>
             <a:endParaRPr lang="en-US" dirty="0"/>
           </a:p>
@@ -3183,7 +3220,7 @@
             <a:fld id="{B61BEF0D-F0BB-DE4B-95CE-6DB70DBA9567}" type="datetimeFigureOut">
               <a:rPr lang="en-US" dirty="0"/>
               <a:pPr/>
-              <a:t>12/14/2016</a:t>
+              <a:t>12/15/2016</a:t>
             </a:fld>
             <a:endParaRPr lang="en-US" dirty="0"/>
           </a:p>
@@ -3350,7 +3387,7 @@
             <a:fld id="{B61BEF0D-F0BB-DE4B-95CE-6DB70DBA9567}" type="datetimeFigureOut">
               <a:rPr lang="en-US" dirty="0"/>
               <a:pPr/>
-              <a:t>12/14/2016</a:t>
+              <a:t>12/15/2016</a:t>
             </a:fld>
             <a:endParaRPr lang="en-US" dirty="0"/>
           </a:p>
@@ -3597,7 +3634,7 @@
             <a:fld id="{B61BEF0D-F0BB-DE4B-95CE-6DB70DBA9567}" type="datetimeFigureOut">
               <a:rPr lang="en-US" dirty="0"/>
               <a:pPr/>
-              <a:t>12/14/2016</a:t>
+              <a:t>12/15/2016</a:t>
             </a:fld>
             <a:endParaRPr lang="en-US" dirty="0"/>
           </a:p>
@@ -3830,7 +3867,7 @@
             <a:fld id="{B61BEF0D-F0BB-DE4B-95CE-6DB70DBA9567}" type="datetimeFigureOut">
               <a:rPr lang="en-US" dirty="0"/>
               <a:pPr/>
-              <a:t>12/14/2016</a:t>
+              <a:t>12/15/2016</a:t>
             </a:fld>
             <a:endParaRPr lang="en-US" dirty="0"/>
           </a:p>
@@ -4209,7 +4246,7 @@
             <a:fld id="{B61BEF0D-F0BB-DE4B-95CE-6DB70DBA9567}" type="datetimeFigureOut">
               <a:rPr lang="en-US" dirty="0"/>
               <a:pPr/>
-              <a:t>12/14/2016</a:t>
+              <a:t>12/15/2016</a:t>
             </a:fld>
             <a:endParaRPr lang="en-US" dirty="0"/>
           </a:p>
@@ -4324,7 +4361,7 @@
             <a:fld id="{B61BEF0D-F0BB-DE4B-95CE-6DB70DBA9567}" type="datetimeFigureOut">
               <a:rPr lang="en-US" dirty="0"/>
               <a:pPr/>
-              <a:t>12/14/2016</a:t>
+              <a:t>12/15/2016</a:t>
             </a:fld>
             <a:endParaRPr lang="en-US" dirty="0"/>
           </a:p>
@@ -4416,7 +4453,7 @@
             <a:fld id="{B61BEF0D-F0BB-DE4B-95CE-6DB70DBA9567}" type="datetimeFigureOut">
               <a:rPr lang="en-US" dirty="0"/>
               <a:pPr/>
-              <a:t>12/14/2016</a:t>
+              <a:t>12/15/2016</a:t>
             </a:fld>
             <a:endParaRPr lang="en-US" dirty="0"/>
           </a:p>
@@ -4668,7 +4705,7 @@
             <a:fld id="{B61BEF0D-F0BB-DE4B-95CE-6DB70DBA9567}" type="datetimeFigureOut">
               <a:rPr lang="en-US" dirty="0"/>
               <a:pPr/>
-              <a:t>12/14/2016</a:t>
+              <a:t>12/15/2016</a:t>
             </a:fld>
             <a:endParaRPr lang="en-US" dirty="0"/>
           </a:p>
@@ -4948,7 +4985,7 @@
             <a:fld id="{B61BEF0D-F0BB-DE4B-95CE-6DB70DBA9567}" type="datetimeFigureOut">
               <a:rPr lang="en-US" dirty="0"/>
               <a:pPr/>
-              <a:t>12/14/2016</a:t>
+              <a:t>12/15/2016</a:t>
             </a:fld>
             <a:endParaRPr lang="en-US" dirty="0"/>
           </a:p>
@@ -5351,7 +5388,7 @@
             <a:fld id="{B61BEF0D-F0BB-DE4B-95CE-6DB70DBA9567}" type="datetimeFigureOut">
               <a:rPr lang="en-US" dirty="0"/>
               <a:pPr/>
-              <a:t>12/14/2016</a:t>
+              <a:t>12/15/2016</a:t>
             </a:fld>
             <a:endParaRPr lang="en-US" dirty="0"/>
           </a:p>
@@ -7826,8 +7863,8 @@
         </p:blipFill>
         <p:spPr>
           <a:xfrm>
-            <a:off x="1225204" y="1897752"/>
-            <a:ext cx="9986135" cy="4728335"/>
+            <a:off x="1113183" y="2242309"/>
+            <a:ext cx="9986135" cy="4397031"/>
           </a:xfrm>
           <a:prstGeom prst="rect">
             <a:avLst/>
@@ -7891,7 +7928,6 @@
               <a:rPr lang="en-IN" sz="4000" dirty="0"/>
               <a:t>How to instantiate the component?</a:t>
             </a:r>
-            <a:endParaRPr lang="en-IN" sz="4000" dirty="0"/>
           </a:p>
         </p:txBody>
       </p:sp>
@@ -7984,13 +8020,8 @@
             <a:pPr algn="ctr"/>
             <a:r>
               <a:rPr lang="en-IN" sz="4000" dirty="0"/>
-              <a:t>An Angular Module is a class with </a:t>
-            </a:r>
-            <a:r>
-              <a:rPr lang="en-IN" sz="4000" dirty="0"/>
-              <a:t>an @NgModule decorator</a:t>
-            </a:r>
-            <a:endParaRPr lang="en-IN" sz="4000" dirty="0"/>
+              <a:t>An Angular Module is a class with an @NgModule decorator</a:t>
+            </a:r>
           </a:p>
         </p:txBody>
       </p:sp>
@@ -8048,13 +8079,8 @@
           <a:p>
             <a:r>
               <a:rPr lang="en-IN" sz="4000" dirty="0"/>
-              <a:t>An Angular Module is a class with </a:t>
-            </a:r>
-            <a:r>
-              <a:rPr lang="en-IN" sz="4000" dirty="0"/>
-              <a:t>an @NgModule decorator</a:t>
-            </a:r>
-            <a:endParaRPr lang="en-IN" sz="4000" dirty="0"/>
+              <a:t>An Angular Module is a class with an @NgModule decorator</a:t>
+            </a:r>
           </a:p>
         </p:txBody>
       </p:sp>
@@ -8090,7 +8116,6 @@
               <a:rPr lang="en-IN" sz="4000" dirty="0"/>
               <a:t>making some of them public so external components can use them</a:t>
             </a:r>
-            <a:endParaRPr lang="en-IN" sz="4000" dirty="0"/>
           </a:p>
         </p:txBody>
       </p:sp>
@@ -8140,7 +8165,7 @@
         </p:blipFill>
         <p:spPr>
           <a:xfrm>
-            <a:off x="649356" y="543339"/>
+            <a:off x="821635" y="821635"/>
             <a:ext cx="10747513" cy="5897218"/>
           </a:xfrm>
           <a:prstGeom prst="rect">
@@ -8148,6 +8173,35 @@
           </a:prstGeom>
         </p:spPr>
       </p:pic>
+      <p:sp>
+        <p:nvSpPr>
+          <p:cNvPr id="3" name="TextBox 2"/>
+          <p:cNvSpPr txBox="1"/>
+          <p:nvPr/>
+        </p:nvSpPr>
+        <p:spPr>
+          <a:xfrm>
+            <a:off x="821635" y="198783"/>
+            <a:ext cx="8415130" cy="646331"/>
+          </a:xfrm>
+          <a:prstGeom prst="rect">
+            <a:avLst/>
+          </a:prstGeom>
+          <a:noFill/>
+        </p:spPr>
+        <p:txBody>
+          <a:bodyPr wrap="square" rtlCol="0">
+            <a:spAutoFit/>
+          </a:bodyPr>
+          <a:lstStyle/>
+          <a:p>
+            <a:r>
+              <a:rPr lang="en-IN" sz="3600" b="1" dirty="0"/>
+              <a:t>Root Module [ app.module.ts ]</a:t>
+            </a:r>
+          </a:p>
+        </p:txBody>
+      </p:sp>
     </p:spTree>
     <p:extLst>
       <p:ext uri="{BB962C8B-B14F-4D97-AF65-F5344CB8AC3E}">
@@ -8286,34 +8340,72 @@
           <a:chExt cx="0" cy="0"/>
         </a:xfrm>
       </p:grpSpPr>
-      <p:pic>
-        <p:nvPicPr>
-          <p:cNvPr id="4" name="Picture 3"/>
-          <p:cNvPicPr>
-            <a:picLocks noChangeAspect="1"/>
-          </p:cNvPicPr>
+      <p:sp>
+        <p:nvSpPr>
+          <p:cNvPr id="2" name="TextBox 1"/>
+          <p:cNvSpPr txBox="1"/>
           <p:nvPr/>
-        </p:nvPicPr>
-        <p:blipFill>
-          <a:blip r:embed="rId2"/>
-          <a:stretch>
-            <a:fillRect/>
-          </a:stretch>
-        </p:blipFill>
-        <p:spPr>
-          <a:xfrm>
-            <a:off x="3790122" y="1987827"/>
-            <a:ext cx="3909391" cy="2941982"/>
-          </a:xfrm>
-          <a:prstGeom prst="rect">
-            <a:avLst/>
-          </a:prstGeom>
-        </p:spPr>
-      </p:pic>
+        </p:nvSpPr>
+        <p:spPr>
+          <a:xfrm>
+            <a:off x="821635" y="649357"/>
+            <a:ext cx="9833113" cy="646331"/>
+          </a:xfrm>
+          <a:prstGeom prst="rect">
+            <a:avLst/>
+          </a:prstGeom>
+          <a:noFill/>
+        </p:spPr>
+        <p:txBody>
+          <a:bodyPr wrap="square" rtlCol="0">
+            <a:spAutoFit/>
+          </a:bodyPr>
+          <a:lstStyle/>
+          <a:p>
+            <a:r>
+              <a:rPr lang="en-IN" sz="3600" dirty="0"/>
+              <a:t>What will be displayed in the Browser  ?</a:t>
+            </a:r>
+          </a:p>
+        </p:txBody>
+      </p:sp>
+      <p:sp>
+        <p:nvSpPr>
+          <p:cNvPr id="4" name="TextBox 3"/>
+          <p:cNvSpPr txBox="1"/>
+          <p:nvPr/>
+        </p:nvSpPr>
+        <p:spPr>
+          <a:xfrm>
+            <a:off x="887896" y="1789043"/>
+            <a:ext cx="9753600" cy="923330"/>
+          </a:xfrm>
+          <a:prstGeom prst="rect">
+            <a:avLst/>
+          </a:prstGeom>
+          <a:noFill/>
+        </p:spPr>
+        <p:txBody>
+          <a:bodyPr wrap="square" rtlCol="0">
+            <a:spAutoFit/>
+          </a:bodyPr>
+          <a:lstStyle/>
+          <a:p>
+            <a:r>
+              <a:rPr lang="en-IN" sz="5400" dirty="0"/>
+              <a:t>Hello</a:t>
+            </a:r>
+            <a:r>
+              <a:rPr lang="en-IN" dirty="0"/>
+              <a:t> </a:t>
+            </a:r>
+          </a:p>
+        </p:txBody>
+      </p:sp>
     </p:spTree>
     <p:extLst>
       <p:ext uri="{BB962C8B-B14F-4D97-AF65-F5344CB8AC3E}">
-        <p14:creationId xmlns:p14="http://schemas.microsoft.com/office/powerpoint/2010/main" val="1652638141"/>
+        <p14:creationId xmlns:p14="http://schemas.microsoft.com/office/powerpoint/2010/main" val="1506608771"/>
       </p:ext>
     </p:extLst>
   </p:cSld>
@@ -8340,41 +8432,34 @@
           <a:chExt cx="0" cy="0"/>
         </a:xfrm>
       </p:grpSpPr>
-      <p:sp>
-        <p:nvSpPr>
-          <p:cNvPr id="3" name="TextBox 2"/>
-          <p:cNvSpPr txBox="1"/>
+      <p:pic>
+        <p:nvPicPr>
+          <p:cNvPr id="4" name="Picture 3"/>
+          <p:cNvPicPr>
+            <a:picLocks noChangeAspect="1"/>
+          </p:cNvPicPr>
           <p:nvPr/>
-        </p:nvSpPr>
-        <p:spPr>
-          <a:xfrm>
-            <a:off x="861391" y="2504667"/>
-            <a:ext cx="10190921" cy="707886"/>
-          </a:xfrm>
-          <a:prstGeom prst="rect">
-            <a:avLst/>
-          </a:prstGeom>
-          <a:noFill/>
-        </p:spPr>
-        <p:txBody>
-          <a:bodyPr wrap="square" rtlCol="0">
-            <a:spAutoFit/>
-          </a:bodyPr>
-          <a:lstStyle/>
-          <a:p>
-            <a:pPr algn="ctr"/>
-            <a:r>
-              <a:rPr lang="en-IN" sz="4000" dirty="0"/>
-              <a:t>Displaying Data ?</a:t>
-            </a:r>
-            <a:endParaRPr lang="en-IN" sz="4000" dirty="0"/>
-          </a:p>
-        </p:txBody>
-      </p:sp>
+        </p:nvPicPr>
+        <p:blipFill>
+          <a:blip r:embed="rId2"/>
+          <a:stretch>
+            <a:fillRect/>
+          </a:stretch>
+        </p:blipFill>
+        <p:spPr>
+          <a:xfrm>
+            <a:off x="3790122" y="1987827"/>
+            <a:ext cx="3909391" cy="2941982"/>
+          </a:xfrm>
+          <a:prstGeom prst="rect">
+            <a:avLst/>
+          </a:prstGeom>
+        </p:spPr>
+      </p:pic>
     </p:spTree>
     <p:extLst>
       <p:ext uri="{BB962C8B-B14F-4D97-AF65-F5344CB8AC3E}">
-        <p14:creationId xmlns:p14="http://schemas.microsoft.com/office/powerpoint/2010/main" val="2598366062"/>
+        <p14:creationId xmlns:p14="http://schemas.microsoft.com/office/powerpoint/2010/main" val="2258345665"/>
       </p:ext>
     </p:extLst>
   </p:cSld>
@@ -8401,34 +8486,40 @@
           <a:chExt cx="0" cy="0"/>
         </a:xfrm>
       </p:grpSpPr>
-      <p:pic>
-        <p:nvPicPr>
-          <p:cNvPr id="2" name="Picture 1"/>
-          <p:cNvPicPr>
-            <a:picLocks noChangeAspect="1"/>
-          </p:cNvPicPr>
+      <p:sp>
+        <p:nvSpPr>
+          <p:cNvPr id="3" name="TextBox 2"/>
+          <p:cNvSpPr txBox="1"/>
           <p:nvPr/>
-        </p:nvPicPr>
-        <p:blipFill>
-          <a:blip r:embed="rId2"/>
-          <a:stretch>
-            <a:fillRect/>
-          </a:stretch>
-        </p:blipFill>
-        <p:spPr>
-          <a:xfrm>
-            <a:off x="821635" y="516836"/>
-            <a:ext cx="10469217" cy="5950226"/>
-          </a:xfrm>
-          <a:prstGeom prst="rect">
-            <a:avLst/>
-          </a:prstGeom>
-        </p:spPr>
-      </p:pic>
+        </p:nvSpPr>
+        <p:spPr>
+          <a:xfrm>
+            <a:off x="861391" y="2504667"/>
+            <a:ext cx="10190921" cy="707886"/>
+          </a:xfrm>
+          <a:prstGeom prst="rect">
+            <a:avLst/>
+          </a:prstGeom>
+          <a:noFill/>
+        </p:spPr>
+        <p:txBody>
+          <a:bodyPr wrap="square" rtlCol="0">
+            <a:spAutoFit/>
+          </a:bodyPr>
+          <a:lstStyle/>
+          <a:p>
+            <a:pPr algn="ctr"/>
+            <a:r>
+              <a:rPr lang="en-IN" sz="4000" dirty="0"/>
+              <a:t>Displaying Data ?</a:t>
+            </a:r>
+          </a:p>
+        </p:txBody>
+      </p:sp>
     </p:spTree>
     <p:extLst>
       <p:ext uri="{BB962C8B-B14F-4D97-AF65-F5344CB8AC3E}">
-        <p14:creationId xmlns:p14="http://schemas.microsoft.com/office/powerpoint/2010/main" val="380479221"/>
+        <p14:creationId xmlns:p14="http://schemas.microsoft.com/office/powerpoint/2010/main" val="2598366062"/>
       </p:ext>
     </p:extLst>
   </p:cSld>
@@ -8542,6 +8633,101 @@
       </p:grpSpPr>
       <p:pic>
         <p:nvPicPr>
+          <p:cNvPr id="2" name="Picture 1"/>
+          <p:cNvPicPr>
+            <a:picLocks noChangeAspect="1"/>
+          </p:cNvPicPr>
+          <p:nvPr/>
+        </p:nvPicPr>
+        <p:blipFill>
+          <a:blip r:embed="rId2"/>
+          <a:stretch>
+            <a:fillRect/>
+          </a:stretch>
+        </p:blipFill>
+        <p:spPr>
+          <a:xfrm>
+            <a:off x="808382" y="132524"/>
+            <a:ext cx="10469217" cy="5155094"/>
+          </a:xfrm>
+          <a:prstGeom prst="rect">
+            <a:avLst/>
+          </a:prstGeom>
+        </p:spPr>
+      </p:pic>
+      <p:sp>
+        <p:nvSpPr>
+          <p:cNvPr id="4" name="TextBox 3"/>
+          <p:cNvSpPr txBox="1"/>
+          <p:nvPr/>
+        </p:nvSpPr>
+        <p:spPr>
+          <a:xfrm>
+            <a:off x="430694" y="5473005"/>
+            <a:ext cx="11224591" cy="1384995"/>
+          </a:xfrm>
+          <a:prstGeom prst="rect">
+            <a:avLst/>
+          </a:prstGeom>
+          <a:noFill/>
+        </p:spPr>
+        <p:txBody>
+          <a:bodyPr wrap="square" rtlCol="0">
+            <a:spAutoFit/>
+          </a:bodyPr>
+          <a:lstStyle/>
+          <a:p>
+            <a:r>
+              <a:rPr lang="en-IN" sz="2800" dirty="0"/>
+              <a:t>Angular automatically pulls the value of the "name" property </a:t>
+            </a:r>
+          </a:p>
+          <a:p>
+            <a:r>
+              <a:rPr lang="en-IN" sz="2800" dirty="0"/>
+              <a:t>from the component and inserts the value into the browser. </a:t>
+            </a:r>
+          </a:p>
+          <a:p>
+            <a:r>
+              <a:rPr lang="en-IN" sz="2800" dirty="0"/>
+              <a:t>Angular updates the display when the property change.</a:t>
+            </a:r>
+          </a:p>
+        </p:txBody>
+      </p:sp>
+    </p:spTree>
+    <p:extLst>
+      <p:ext uri="{BB962C8B-B14F-4D97-AF65-F5344CB8AC3E}">
+        <p14:creationId xmlns:p14="http://schemas.microsoft.com/office/powerpoint/2010/main" val="380479221"/>
+      </p:ext>
+    </p:extLst>
+  </p:cSld>
+  <p:clrMapOvr>
+    <a:masterClrMapping/>
+  </p:clrMapOvr>
+</p:sld>
+</file>
+
+<file path=ppt/slides/slide41.xml><?xml version="1.0" encoding="utf-8"?>
+<p:sld xmlns:a="http://schemas.openxmlformats.org/drawingml/2006/main" xmlns:r="http://schemas.openxmlformats.org/officeDocument/2006/relationships" xmlns:p="http://schemas.openxmlformats.org/presentationml/2006/main">
+  <p:cSld>
+    <p:spTree>
+      <p:nvGrpSpPr>
+        <p:cNvPr id="1" name=""/>
+        <p:cNvGrpSpPr/>
+        <p:nvPr/>
+      </p:nvGrpSpPr>
+      <p:grpSpPr>
+        <a:xfrm>
+          <a:off x="0" y="0"/>
+          <a:ext cx="0" cy="0"/>
+          <a:chOff x="0" y="0"/>
+          <a:chExt cx="0" cy="0"/>
+        </a:xfrm>
+      </p:grpSpPr>
+      <p:pic>
+        <p:nvPicPr>
           <p:cNvPr id="3" name="Picture 2"/>
           <p:cNvPicPr>
             <a:picLocks noChangeAspect="1"/>
@@ -8556,6 +8742,60 @@
         </p:blipFill>
         <p:spPr>
           <a:xfrm>
+            <a:off x="2881312" y="1533525"/>
+            <a:ext cx="6429375" cy="3790950"/>
+          </a:xfrm>
+          <a:prstGeom prst="rect">
+            <a:avLst/>
+          </a:prstGeom>
+        </p:spPr>
+      </p:pic>
+    </p:spTree>
+    <p:extLst>
+      <p:ext uri="{BB962C8B-B14F-4D97-AF65-F5344CB8AC3E}">
+        <p14:creationId xmlns:p14="http://schemas.microsoft.com/office/powerpoint/2010/main" val="3754535181"/>
+      </p:ext>
+    </p:extLst>
+  </p:cSld>
+  <p:clrMapOvr>
+    <a:masterClrMapping/>
+  </p:clrMapOvr>
+</p:sld>
+</file>
+
+<file path=ppt/slides/slide42.xml><?xml version="1.0" encoding="utf-8"?>
+<p:sld xmlns:a="http://schemas.openxmlformats.org/drawingml/2006/main" xmlns:r="http://schemas.openxmlformats.org/officeDocument/2006/relationships" xmlns:p="http://schemas.openxmlformats.org/presentationml/2006/main">
+  <p:cSld>
+    <p:spTree>
+      <p:nvGrpSpPr>
+        <p:cNvPr id="1" name=""/>
+        <p:cNvGrpSpPr/>
+        <p:nvPr/>
+      </p:nvGrpSpPr>
+      <p:grpSpPr>
+        <a:xfrm>
+          <a:off x="0" y="0"/>
+          <a:ext cx="0" cy="0"/>
+          <a:chOff x="0" y="0"/>
+          <a:chExt cx="0" cy="0"/>
+        </a:xfrm>
+      </p:grpSpPr>
+      <p:pic>
+        <p:nvPicPr>
+          <p:cNvPr id="3" name="Picture 2"/>
+          <p:cNvPicPr>
+            <a:picLocks noChangeAspect="1"/>
+          </p:cNvPicPr>
+          <p:nvPr/>
+        </p:nvPicPr>
+        <p:blipFill>
+          <a:blip r:embed="rId2"/>
+          <a:stretch>
+            <a:fillRect/>
+          </a:stretch>
+        </p:blipFill>
+        <p:spPr>
+          <a:xfrm>
             <a:off x="569843" y="278296"/>
             <a:ext cx="10747514" cy="6255026"/>
           </a:xfrm>
@@ -8568,6 +8808,426 @@
     <p:extLst>
       <p:ext uri="{BB962C8B-B14F-4D97-AF65-F5344CB8AC3E}">
         <p14:creationId xmlns:p14="http://schemas.microsoft.com/office/powerpoint/2010/main" val="4054691931"/>
+      </p:ext>
+    </p:extLst>
+  </p:cSld>
+  <p:clrMapOvr>
+    <a:masterClrMapping/>
+  </p:clrMapOvr>
+</p:sld>
+</file>
+
+<file path=ppt/slides/slide43.xml><?xml version="1.0" encoding="utf-8"?>
+<p:sld xmlns:a="http://schemas.openxmlformats.org/drawingml/2006/main" xmlns:r="http://schemas.openxmlformats.org/officeDocument/2006/relationships" xmlns:p="http://schemas.openxmlformats.org/presentationml/2006/main">
+  <p:cSld>
+    <p:spTree>
+      <p:nvGrpSpPr>
+        <p:cNvPr id="1" name=""/>
+        <p:cNvGrpSpPr/>
+        <p:nvPr/>
+      </p:nvGrpSpPr>
+      <p:grpSpPr>
+        <a:xfrm>
+          <a:off x="0" y="0"/>
+          <a:ext cx="0" cy="0"/>
+          <a:chOff x="0" y="0"/>
+          <a:chExt cx="0" cy="0"/>
+        </a:xfrm>
+      </p:grpSpPr>
+      <p:sp>
+        <p:nvSpPr>
+          <p:cNvPr id="4" name="TextBox 3"/>
+          <p:cNvSpPr txBox="1"/>
+          <p:nvPr/>
+        </p:nvSpPr>
+        <p:spPr>
+          <a:xfrm>
+            <a:off x="622852" y="238546"/>
+            <a:ext cx="10190921" cy="1938992"/>
+          </a:xfrm>
+          <a:prstGeom prst="rect">
+            <a:avLst/>
+          </a:prstGeom>
+          <a:noFill/>
+        </p:spPr>
+        <p:txBody>
+          <a:bodyPr wrap="square" rtlCol="0">
+            <a:spAutoFit/>
+          </a:bodyPr>
+          <a:lstStyle/>
+          <a:p>
+            <a:pPr algn="ctr"/>
+            <a:r>
+              <a:rPr lang="en-IN" sz="4000" dirty="0"/>
+              <a:t>Template inline or template file?</a:t>
+            </a:r>
+          </a:p>
+          <a:p>
+            <a:br>
+              <a:rPr lang="en-IN" sz="4000" dirty="0"/>
+            </a:br>
+            <a:endParaRPr lang="en-IN" sz="4000" dirty="0"/>
+          </a:p>
+        </p:txBody>
+      </p:sp>
+      <p:pic>
+        <p:nvPicPr>
+          <p:cNvPr id="2" name="Picture 1"/>
+          <p:cNvPicPr>
+            <a:picLocks noChangeAspect="1"/>
+          </p:cNvPicPr>
+          <p:nvPr/>
+        </p:nvPicPr>
+        <p:blipFill>
+          <a:blip r:embed="rId2"/>
+          <a:stretch>
+            <a:fillRect/>
+          </a:stretch>
+        </p:blipFill>
+        <p:spPr>
+          <a:xfrm>
+            <a:off x="925166" y="1099930"/>
+            <a:ext cx="10047633" cy="5618922"/>
+          </a:xfrm>
+          <a:prstGeom prst="rect">
+            <a:avLst/>
+          </a:prstGeom>
+        </p:spPr>
+      </p:pic>
+    </p:spTree>
+    <p:extLst>
+      <p:ext uri="{BB962C8B-B14F-4D97-AF65-F5344CB8AC3E}">
+        <p14:creationId xmlns:p14="http://schemas.microsoft.com/office/powerpoint/2010/main" val="1399776997"/>
+      </p:ext>
+    </p:extLst>
+  </p:cSld>
+  <p:clrMapOvr>
+    <a:masterClrMapping/>
+  </p:clrMapOvr>
+</p:sld>
+</file>
+
+<file path=ppt/slides/slide44.xml><?xml version="1.0" encoding="utf-8"?>
+<p:sld xmlns:a="http://schemas.openxmlformats.org/drawingml/2006/main" xmlns:r="http://schemas.openxmlformats.org/officeDocument/2006/relationships" xmlns:p="http://schemas.openxmlformats.org/presentationml/2006/main">
+  <p:cSld>
+    <p:spTree>
+      <p:nvGrpSpPr>
+        <p:cNvPr id="1" name=""/>
+        <p:cNvGrpSpPr/>
+        <p:nvPr/>
+      </p:nvGrpSpPr>
+      <p:grpSpPr>
+        <a:xfrm>
+          <a:off x="0" y="0"/>
+          <a:ext cx="0" cy="0"/>
+          <a:chOff x="0" y="0"/>
+          <a:chExt cx="0" cy="0"/>
+        </a:xfrm>
+      </p:grpSpPr>
+      <p:pic>
+        <p:nvPicPr>
+          <p:cNvPr id="5" name="Picture 4"/>
+          <p:cNvPicPr>
+            <a:picLocks noChangeAspect="1"/>
+          </p:cNvPicPr>
+          <p:nvPr/>
+        </p:nvPicPr>
+        <p:blipFill>
+          <a:blip r:embed="rId2"/>
+          <a:stretch>
+            <a:fillRect/>
+          </a:stretch>
+        </p:blipFill>
+        <p:spPr>
+          <a:xfrm>
+            <a:off x="1842052" y="808383"/>
+            <a:ext cx="8454887" cy="4823791"/>
+          </a:xfrm>
+          <a:prstGeom prst="rect">
+            <a:avLst/>
+          </a:prstGeom>
+        </p:spPr>
+      </p:pic>
+    </p:spTree>
+    <p:extLst>
+      <p:ext uri="{BB962C8B-B14F-4D97-AF65-F5344CB8AC3E}">
+        <p14:creationId xmlns:p14="http://schemas.microsoft.com/office/powerpoint/2010/main" val="822323114"/>
+      </p:ext>
+    </p:extLst>
+  </p:cSld>
+  <p:clrMapOvr>
+    <a:masterClrMapping/>
+  </p:clrMapOvr>
+</p:sld>
+</file>
+
+<file path=ppt/slides/slide45.xml><?xml version="1.0" encoding="utf-8"?>
+<p:sld xmlns:a="http://schemas.openxmlformats.org/drawingml/2006/main" xmlns:r="http://schemas.openxmlformats.org/officeDocument/2006/relationships" xmlns:p="http://schemas.openxmlformats.org/presentationml/2006/main">
+  <p:cSld>
+    <p:spTree>
+      <p:nvGrpSpPr>
+        <p:cNvPr id="1" name=""/>
+        <p:cNvGrpSpPr/>
+        <p:nvPr/>
+      </p:nvGrpSpPr>
+      <p:grpSpPr>
+        <a:xfrm>
+          <a:off x="0" y="0"/>
+          <a:ext cx="0" cy="0"/>
+          <a:chOff x="0" y="0"/>
+          <a:chExt cx="0" cy="0"/>
+        </a:xfrm>
+      </p:grpSpPr>
+      <p:pic>
+        <p:nvPicPr>
+          <p:cNvPr id="4" name="Picture 3"/>
+          <p:cNvPicPr>
+            <a:picLocks noChangeAspect="1"/>
+          </p:cNvPicPr>
+          <p:nvPr/>
+        </p:nvPicPr>
+        <p:blipFill>
+          <a:blip r:embed="rId2"/>
+          <a:stretch>
+            <a:fillRect/>
+          </a:stretch>
+        </p:blipFill>
+        <p:spPr>
+          <a:xfrm>
+            <a:off x="1871662" y="1376362"/>
+            <a:ext cx="8448675" cy="4105275"/>
+          </a:xfrm>
+          <a:prstGeom prst="rect">
+            <a:avLst/>
+          </a:prstGeom>
+        </p:spPr>
+      </p:pic>
+    </p:spTree>
+    <p:extLst>
+      <p:ext uri="{BB962C8B-B14F-4D97-AF65-F5344CB8AC3E}">
+        <p14:creationId xmlns:p14="http://schemas.microsoft.com/office/powerpoint/2010/main" val="2409726143"/>
+      </p:ext>
+    </p:extLst>
+  </p:cSld>
+  <p:clrMapOvr>
+    <a:masterClrMapping/>
+  </p:clrMapOvr>
+</p:sld>
+</file>
+
+<file path=ppt/slides/slide46.xml><?xml version="1.0" encoding="utf-8"?>
+<p:sld xmlns:a="http://schemas.openxmlformats.org/drawingml/2006/main" xmlns:r="http://schemas.openxmlformats.org/officeDocument/2006/relationships" xmlns:p="http://schemas.openxmlformats.org/presentationml/2006/main">
+  <p:cSld>
+    <p:spTree>
+      <p:nvGrpSpPr>
+        <p:cNvPr id="1" name=""/>
+        <p:cNvGrpSpPr/>
+        <p:nvPr/>
+      </p:nvGrpSpPr>
+      <p:grpSpPr>
+        <a:xfrm>
+          <a:off x="0" y="0"/>
+          <a:ext cx="0" cy="0"/>
+          <a:chOff x="0" y="0"/>
+          <a:chExt cx="0" cy="0"/>
+        </a:xfrm>
+      </p:grpSpPr>
+      <p:pic>
+        <p:nvPicPr>
+          <p:cNvPr id="5" name="Picture 4"/>
+          <p:cNvPicPr>
+            <a:picLocks noChangeAspect="1"/>
+          </p:cNvPicPr>
+          <p:nvPr/>
+        </p:nvPicPr>
+        <p:blipFill>
+          <a:blip r:embed="rId2"/>
+          <a:stretch>
+            <a:fillRect/>
+          </a:stretch>
+        </p:blipFill>
+        <p:spPr>
+          <a:xfrm>
+            <a:off x="1924050" y="862012"/>
+            <a:ext cx="8343900" cy="5133975"/>
+          </a:xfrm>
+          <a:prstGeom prst="rect">
+            <a:avLst/>
+          </a:prstGeom>
+        </p:spPr>
+      </p:pic>
+    </p:spTree>
+    <p:extLst>
+      <p:ext uri="{BB962C8B-B14F-4D97-AF65-F5344CB8AC3E}">
+        <p14:creationId xmlns:p14="http://schemas.microsoft.com/office/powerpoint/2010/main" val="741831136"/>
+      </p:ext>
+    </p:extLst>
+  </p:cSld>
+  <p:clrMapOvr>
+    <a:masterClrMapping/>
+  </p:clrMapOvr>
+</p:sld>
+</file>
+
+<file path=ppt/slides/slide47.xml><?xml version="1.0" encoding="utf-8"?>
+<p:sld xmlns:a="http://schemas.openxmlformats.org/drawingml/2006/main" xmlns:r="http://schemas.openxmlformats.org/officeDocument/2006/relationships" xmlns:p="http://schemas.openxmlformats.org/presentationml/2006/main">
+  <p:cSld>
+    <p:spTree>
+      <p:nvGrpSpPr>
+        <p:cNvPr id="1" name=""/>
+        <p:cNvGrpSpPr/>
+        <p:nvPr/>
+      </p:nvGrpSpPr>
+      <p:grpSpPr>
+        <a:xfrm>
+          <a:off x="0" y="0"/>
+          <a:ext cx="0" cy="0"/>
+          <a:chOff x="0" y="0"/>
+          <a:chExt cx="0" cy="0"/>
+        </a:xfrm>
+      </p:grpSpPr>
+      <p:pic>
+        <p:nvPicPr>
+          <p:cNvPr id="3" name="Picture 2"/>
+          <p:cNvPicPr>
+            <a:picLocks noChangeAspect="1"/>
+          </p:cNvPicPr>
+          <p:nvPr/>
+        </p:nvPicPr>
+        <p:blipFill>
+          <a:blip r:embed="rId2"/>
+          <a:stretch>
+            <a:fillRect/>
+          </a:stretch>
+        </p:blipFill>
+        <p:spPr>
+          <a:xfrm>
+            <a:off x="2900362" y="1128712"/>
+            <a:ext cx="6391275" cy="4600575"/>
+          </a:xfrm>
+          <a:prstGeom prst="rect">
+            <a:avLst/>
+          </a:prstGeom>
+        </p:spPr>
+      </p:pic>
+    </p:spTree>
+    <p:extLst>
+      <p:ext uri="{BB962C8B-B14F-4D97-AF65-F5344CB8AC3E}">
+        <p14:creationId xmlns:p14="http://schemas.microsoft.com/office/powerpoint/2010/main" val="1076815342"/>
+      </p:ext>
+    </p:extLst>
+  </p:cSld>
+  <p:clrMapOvr>
+    <a:masterClrMapping/>
+  </p:clrMapOvr>
+</p:sld>
+</file>
+
+<file path=ppt/slides/slide48.xml><?xml version="1.0" encoding="utf-8"?>
+<p:sld xmlns:a="http://schemas.openxmlformats.org/drawingml/2006/main" xmlns:r="http://schemas.openxmlformats.org/officeDocument/2006/relationships" xmlns:p="http://schemas.openxmlformats.org/presentationml/2006/main">
+  <p:cSld>
+    <p:spTree>
+      <p:nvGrpSpPr>
+        <p:cNvPr id="1" name=""/>
+        <p:cNvGrpSpPr/>
+        <p:nvPr/>
+      </p:nvGrpSpPr>
+      <p:grpSpPr>
+        <a:xfrm>
+          <a:off x="0" y="0"/>
+          <a:ext cx="0" cy="0"/>
+          <a:chOff x="0" y="0"/>
+          <a:chExt cx="0" cy="0"/>
+        </a:xfrm>
+      </p:grpSpPr>
+      <p:sp>
+        <p:nvSpPr>
+          <p:cNvPr id="4" name="TextBox 3"/>
+          <p:cNvSpPr txBox="1"/>
+          <p:nvPr/>
+        </p:nvSpPr>
+        <p:spPr>
+          <a:xfrm>
+            <a:off x="225287" y="2504667"/>
+            <a:ext cx="11675165" cy="707886"/>
+          </a:xfrm>
+          <a:prstGeom prst="rect">
+            <a:avLst/>
+          </a:prstGeom>
+          <a:noFill/>
+        </p:spPr>
+        <p:txBody>
+          <a:bodyPr wrap="square" rtlCol="0">
+            <a:spAutoFit/>
+          </a:bodyPr>
+          <a:lstStyle/>
+          <a:p>
+            <a:pPr algn="ctr"/>
+            <a:r>
+              <a:rPr lang="en-IN" sz="4000" dirty="0"/>
+              <a:t>Using Directives [ *ngFor and *ngIf ]</a:t>
+            </a:r>
+          </a:p>
+        </p:txBody>
+      </p:sp>
+    </p:spTree>
+    <p:extLst>
+      <p:ext uri="{BB962C8B-B14F-4D97-AF65-F5344CB8AC3E}">
+        <p14:creationId xmlns:p14="http://schemas.microsoft.com/office/powerpoint/2010/main" val="349535921"/>
+      </p:ext>
+    </p:extLst>
+  </p:cSld>
+  <p:clrMapOvr>
+    <a:masterClrMapping/>
+  </p:clrMapOvr>
+</p:sld>
+</file>
+
+<file path=ppt/slides/slide49.xml><?xml version="1.0" encoding="utf-8"?>
+<p:sld xmlns:a="http://schemas.openxmlformats.org/drawingml/2006/main" xmlns:r="http://schemas.openxmlformats.org/officeDocument/2006/relationships" xmlns:p="http://schemas.openxmlformats.org/presentationml/2006/main">
+  <p:cSld>
+    <p:spTree>
+      <p:nvGrpSpPr>
+        <p:cNvPr id="1" name=""/>
+        <p:cNvGrpSpPr/>
+        <p:nvPr/>
+      </p:nvGrpSpPr>
+      <p:grpSpPr>
+        <a:xfrm>
+          <a:off x="0" y="0"/>
+          <a:ext cx="0" cy="0"/>
+          <a:chOff x="0" y="0"/>
+          <a:chExt cx="0" cy="0"/>
+        </a:xfrm>
+      </p:grpSpPr>
+      <p:pic>
+        <p:nvPicPr>
+          <p:cNvPr id="3" name="Picture 2"/>
+          <p:cNvPicPr>
+            <a:picLocks noChangeAspect="1"/>
+          </p:cNvPicPr>
+          <p:nvPr/>
+        </p:nvPicPr>
+        <p:blipFill>
+          <a:blip r:embed="rId2"/>
+          <a:stretch>
+            <a:fillRect/>
+          </a:stretch>
+        </p:blipFill>
+        <p:spPr>
+          <a:xfrm>
+            <a:off x="702365" y="980661"/>
+            <a:ext cx="10654747" cy="5062330"/>
+          </a:xfrm>
+          <a:prstGeom prst="rect">
+            <a:avLst/>
+          </a:prstGeom>
+        </p:spPr>
+      </p:pic>
+    </p:spTree>
+    <p:extLst>
+      <p:ext uri="{BB962C8B-B14F-4D97-AF65-F5344CB8AC3E}">
+        <p14:creationId xmlns:p14="http://schemas.microsoft.com/office/powerpoint/2010/main" val="3452125771"/>
       </p:ext>
     </p:extLst>
   </p:cSld>
@@ -8631,6 +9291,595 @@
 </p:sld>
 </file>
 
+<file path=ppt/slides/slide50.xml><?xml version="1.0" encoding="utf-8"?>
+<p:sld xmlns:a="http://schemas.openxmlformats.org/drawingml/2006/main" xmlns:r="http://schemas.openxmlformats.org/officeDocument/2006/relationships" xmlns:p="http://schemas.openxmlformats.org/presentationml/2006/main">
+  <p:cSld>
+    <p:spTree>
+      <p:nvGrpSpPr>
+        <p:cNvPr id="1" name=""/>
+        <p:cNvGrpSpPr/>
+        <p:nvPr/>
+      </p:nvGrpSpPr>
+      <p:grpSpPr>
+        <a:xfrm>
+          <a:off x="0" y="0"/>
+          <a:ext cx="0" cy="0"/>
+          <a:chOff x="0" y="0"/>
+          <a:chExt cx="0" cy="0"/>
+        </a:xfrm>
+      </p:grpSpPr>
+      <p:pic>
+        <p:nvPicPr>
+          <p:cNvPr id="5" name="Picture 4"/>
+          <p:cNvPicPr>
+            <a:picLocks noChangeAspect="1"/>
+          </p:cNvPicPr>
+          <p:nvPr/>
+        </p:nvPicPr>
+        <p:blipFill>
+          <a:blip r:embed="rId2"/>
+          <a:stretch>
+            <a:fillRect/>
+          </a:stretch>
+        </p:blipFill>
+        <p:spPr>
+          <a:xfrm>
+            <a:off x="1109662" y="981075"/>
+            <a:ext cx="9972675" cy="5033962"/>
+          </a:xfrm>
+          <a:prstGeom prst="rect">
+            <a:avLst/>
+          </a:prstGeom>
+        </p:spPr>
+      </p:pic>
+    </p:spTree>
+    <p:extLst>
+      <p:ext uri="{BB962C8B-B14F-4D97-AF65-F5344CB8AC3E}">
+        <p14:creationId xmlns:p14="http://schemas.microsoft.com/office/powerpoint/2010/main" val="1386925200"/>
+      </p:ext>
+    </p:extLst>
+  </p:cSld>
+  <p:clrMapOvr>
+    <a:masterClrMapping/>
+  </p:clrMapOvr>
+</p:sld>
+</file>
+
+<file path=ppt/slides/slide51.xml><?xml version="1.0" encoding="utf-8"?>
+<p:sld xmlns:a="http://schemas.openxmlformats.org/drawingml/2006/main" xmlns:r="http://schemas.openxmlformats.org/officeDocument/2006/relationships" xmlns:p="http://schemas.openxmlformats.org/presentationml/2006/main">
+  <p:cSld>
+    <p:spTree>
+      <p:nvGrpSpPr>
+        <p:cNvPr id="1" name=""/>
+        <p:cNvGrpSpPr/>
+        <p:nvPr/>
+      </p:nvGrpSpPr>
+      <p:grpSpPr>
+        <a:xfrm>
+          <a:off x="0" y="0"/>
+          <a:ext cx="0" cy="0"/>
+          <a:chOff x="0" y="0"/>
+          <a:chExt cx="0" cy="0"/>
+        </a:xfrm>
+      </p:grpSpPr>
+      <p:pic>
+        <p:nvPicPr>
+          <p:cNvPr id="4" name="Picture 3"/>
+          <p:cNvPicPr>
+            <a:picLocks noChangeAspect="1"/>
+          </p:cNvPicPr>
+          <p:nvPr/>
+        </p:nvPicPr>
+        <p:blipFill>
+          <a:blip r:embed="rId2"/>
+          <a:stretch>
+            <a:fillRect/>
+          </a:stretch>
+        </p:blipFill>
+        <p:spPr>
+          <a:xfrm>
+            <a:off x="2433637" y="1252537"/>
+            <a:ext cx="5838825" cy="4657725"/>
+          </a:xfrm>
+          <a:prstGeom prst="rect">
+            <a:avLst/>
+          </a:prstGeom>
+        </p:spPr>
+      </p:pic>
+    </p:spTree>
+    <p:extLst>
+      <p:ext uri="{BB962C8B-B14F-4D97-AF65-F5344CB8AC3E}">
+        <p14:creationId xmlns:p14="http://schemas.microsoft.com/office/powerpoint/2010/main" val="1259031922"/>
+      </p:ext>
+    </p:extLst>
+  </p:cSld>
+  <p:clrMapOvr>
+    <a:masterClrMapping/>
+  </p:clrMapOvr>
+</p:sld>
+</file>
+
+<file path=ppt/slides/slide52.xml><?xml version="1.0" encoding="utf-8"?>
+<p:sld xmlns:a="http://schemas.openxmlformats.org/drawingml/2006/main" xmlns:r="http://schemas.openxmlformats.org/officeDocument/2006/relationships" xmlns:p="http://schemas.openxmlformats.org/presentationml/2006/main">
+  <p:cSld>
+    <p:spTree>
+      <p:nvGrpSpPr>
+        <p:cNvPr id="1" name=""/>
+        <p:cNvGrpSpPr/>
+        <p:nvPr/>
+      </p:nvGrpSpPr>
+      <p:grpSpPr>
+        <a:xfrm>
+          <a:off x="0" y="0"/>
+          <a:ext cx="0" cy="0"/>
+          <a:chOff x="0" y="0"/>
+          <a:chExt cx="0" cy="0"/>
+        </a:xfrm>
+      </p:grpSpPr>
+      <p:sp>
+        <p:nvSpPr>
+          <p:cNvPr id="3" name="TextBox 2"/>
+          <p:cNvSpPr txBox="1"/>
+          <p:nvPr/>
+        </p:nvSpPr>
+        <p:spPr>
+          <a:xfrm>
+            <a:off x="-67503" y="256761"/>
+            <a:ext cx="11873948" cy="923330"/>
+          </a:xfrm>
+          <a:prstGeom prst="rect">
+            <a:avLst/>
+          </a:prstGeom>
+          <a:noFill/>
+        </p:spPr>
+        <p:txBody>
+          <a:bodyPr wrap="square" rtlCol="0">
+            <a:spAutoFit/>
+          </a:bodyPr>
+          <a:lstStyle/>
+          <a:p>
+            <a:pPr algn="ctr"/>
+            <a:r>
+              <a:rPr lang="en-IN" sz="5400" b="1" dirty="0">
+                <a:latin typeface="Verdana" panose="020B0604030504040204" pitchFamily="34" charset="0"/>
+                <a:ea typeface="Verdana" panose="020B0604030504040204" pitchFamily="34" charset="0"/>
+                <a:cs typeface="Verdana" panose="020B0604030504040204" pitchFamily="34" charset="0"/>
+              </a:rPr>
+              <a:t>DOM Events</a:t>
+            </a:r>
+          </a:p>
+        </p:txBody>
+      </p:sp>
+      <p:sp>
+        <p:nvSpPr>
+          <p:cNvPr id="5" name="TextBox 4"/>
+          <p:cNvSpPr txBox="1"/>
+          <p:nvPr/>
+        </p:nvSpPr>
+        <p:spPr>
+          <a:xfrm>
+            <a:off x="1038225" y="2259911"/>
+            <a:ext cx="10393431" cy="954107"/>
+          </a:xfrm>
+          <a:prstGeom prst="rect">
+            <a:avLst/>
+          </a:prstGeom>
+          <a:noFill/>
+        </p:spPr>
+        <p:txBody>
+          <a:bodyPr wrap="square" rtlCol="0">
+            <a:spAutoFit/>
+          </a:bodyPr>
+          <a:lstStyle/>
+          <a:p>
+            <a:r>
+              <a:rPr lang="en-IN" sz="2800" dirty="0"/>
+              <a:t>User actions such as clicking a link, pushing a button, and entering text raise DOM events.</a:t>
+            </a:r>
+          </a:p>
+        </p:txBody>
+      </p:sp>
+    </p:spTree>
+    <p:extLst>
+      <p:ext uri="{BB962C8B-B14F-4D97-AF65-F5344CB8AC3E}">
+        <p14:creationId xmlns:p14="http://schemas.microsoft.com/office/powerpoint/2010/main" val="2734092108"/>
+      </p:ext>
+    </p:extLst>
+  </p:cSld>
+  <p:clrMapOvr>
+    <a:masterClrMapping/>
+  </p:clrMapOvr>
+</p:sld>
+</file>
+
+<file path=ppt/slides/slide53.xml><?xml version="1.0" encoding="utf-8"?>
+<p:sld xmlns:a="http://schemas.openxmlformats.org/drawingml/2006/main" xmlns:r="http://schemas.openxmlformats.org/officeDocument/2006/relationships" xmlns:p="http://schemas.openxmlformats.org/presentationml/2006/main">
+  <p:cSld>
+    <p:spTree>
+      <p:nvGrpSpPr>
+        <p:cNvPr id="1" name=""/>
+        <p:cNvGrpSpPr/>
+        <p:nvPr/>
+      </p:nvGrpSpPr>
+      <p:grpSpPr>
+        <a:xfrm>
+          <a:off x="0" y="0"/>
+          <a:ext cx="0" cy="0"/>
+          <a:chOff x="0" y="0"/>
+          <a:chExt cx="0" cy="0"/>
+        </a:xfrm>
+      </p:grpSpPr>
+      <p:pic>
+        <p:nvPicPr>
+          <p:cNvPr id="2" name="Picture 1"/>
+          <p:cNvPicPr>
+            <a:picLocks noChangeAspect="1"/>
+          </p:cNvPicPr>
+          <p:nvPr/>
+        </p:nvPicPr>
+        <p:blipFill>
+          <a:blip r:embed="rId2"/>
+          <a:stretch>
+            <a:fillRect/>
+          </a:stretch>
+        </p:blipFill>
+        <p:spPr>
+          <a:xfrm>
+            <a:off x="1019175" y="1366837"/>
+            <a:ext cx="10287000" cy="4752975"/>
+          </a:xfrm>
+          <a:prstGeom prst="rect">
+            <a:avLst/>
+          </a:prstGeom>
+        </p:spPr>
+      </p:pic>
+    </p:spTree>
+    <p:extLst>
+      <p:ext uri="{BB962C8B-B14F-4D97-AF65-F5344CB8AC3E}">
+        <p14:creationId xmlns:p14="http://schemas.microsoft.com/office/powerpoint/2010/main" val="3284488339"/>
+      </p:ext>
+    </p:extLst>
+  </p:cSld>
+  <p:clrMapOvr>
+    <a:masterClrMapping/>
+  </p:clrMapOvr>
+</p:sld>
+</file>
+
+<file path=ppt/slides/slide54.xml><?xml version="1.0" encoding="utf-8"?>
+<p:sld xmlns:a="http://schemas.openxmlformats.org/drawingml/2006/main" xmlns:r="http://schemas.openxmlformats.org/officeDocument/2006/relationships" xmlns:p="http://schemas.openxmlformats.org/presentationml/2006/main">
+  <p:cSld>
+    <p:spTree>
+      <p:nvGrpSpPr>
+        <p:cNvPr id="1" name=""/>
+        <p:cNvGrpSpPr/>
+        <p:nvPr/>
+      </p:nvGrpSpPr>
+      <p:grpSpPr>
+        <a:xfrm>
+          <a:off x="0" y="0"/>
+          <a:ext cx="0" cy="0"/>
+          <a:chOff x="0" y="0"/>
+          <a:chExt cx="0" cy="0"/>
+        </a:xfrm>
+      </p:grpSpPr>
+      <p:pic>
+        <p:nvPicPr>
+          <p:cNvPr id="2" name="Picture 1"/>
+          <p:cNvPicPr>
+            <a:picLocks noChangeAspect="1"/>
+          </p:cNvPicPr>
+          <p:nvPr/>
+        </p:nvPicPr>
+        <p:blipFill>
+          <a:blip r:embed="rId2"/>
+          <a:stretch>
+            <a:fillRect/>
+          </a:stretch>
+        </p:blipFill>
+        <p:spPr>
+          <a:xfrm>
+            <a:off x="2705100" y="1200150"/>
+            <a:ext cx="6705600" cy="5143500"/>
+          </a:xfrm>
+          <a:prstGeom prst="rect">
+            <a:avLst/>
+          </a:prstGeom>
+        </p:spPr>
+      </p:pic>
+    </p:spTree>
+    <p:extLst>
+      <p:ext uri="{BB962C8B-B14F-4D97-AF65-F5344CB8AC3E}">
+        <p14:creationId xmlns:p14="http://schemas.microsoft.com/office/powerpoint/2010/main" val="3526201085"/>
+      </p:ext>
+    </p:extLst>
+  </p:cSld>
+  <p:clrMapOvr>
+    <a:masterClrMapping/>
+  </p:clrMapOvr>
+</p:sld>
+</file>
+
+<file path=ppt/slides/slide55.xml><?xml version="1.0" encoding="utf-8"?>
+<p:sld xmlns:a="http://schemas.openxmlformats.org/drawingml/2006/main" xmlns:r="http://schemas.openxmlformats.org/officeDocument/2006/relationships" xmlns:p="http://schemas.openxmlformats.org/presentationml/2006/main">
+  <p:cSld>
+    <p:spTree>
+      <p:nvGrpSpPr>
+        <p:cNvPr id="1" name=""/>
+        <p:cNvGrpSpPr/>
+        <p:nvPr/>
+      </p:nvGrpSpPr>
+      <p:grpSpPr>
+        <a:xfrm>
+          <a:off x="0" y="0"/>
+          <a:ext cx="0" cy="0"/>
+          <a:chOff x="0" y="0"/>
+          <a:chExt cx="0" cy="0"/>
+        </a:xfrm>
+      </p:grpSpPr>
+      <p:pic>
+        <p:nvPicPr>
+          <p:cNvPr id="3" name="Picture 2"/>
+          <p:cNvPicPr>
+            <a:picLocks noChangeAspect="1"/>
+          </p:cNvPicPr>
+          <p:nvPr/>
+        </p:nvPicPr>
+        <p:blipFill>
+          <a:blip r:embed="rId2"/>
+          <a:stretch>
+            <a:fillRect/>
+          </a:stretch>
+        </p:blipFill>
+        <p:spPr>
+          <a:xfrm>
+            <a:off x="1023937" y="947737"/>
+            <a:ext cx="10144125" cy="4962525"/>
+          </a:xfrm>
+          <a:prstGeom prst="rect">
+            <a:avLst/>
+          </a:prstGeom>
+        </p:spPr>
+      </p:pic>
+    </p:spTree>
+    <p:extLst>
+      <p:ext uri="{BB962C8B-B14F-4D97-AF65-F5344CB8AC3E}">
+        <p14:creationId xmlns:p14="http://schemas.microsoft.com/office/powerpoint/2010/main" val="764403090"/>
+      </p:ext>
+    </p:extLst>
+  </p:cSld>
+  <p:clrMapOvr>
+    <a:masterClrMapping/>
+  </p:clrMapOvr>
+</p:sld>
+</file>
+
+<file path=ppt/slides/slide56.xml><?xml version="1.0" encoding="utf-8"?>
+<p:sld xmlns:a="http://schemas.openxmlformats.org/drawingml/2006/main" xmlns:r="http://schemas.openxmlformats.org/officeDocument/2006/relationships" xmlns:p="http://schemas.openxmlformats.org/presentationml/2006/main">
+  <p:cSld>
+    <p:spTree>
+      <p:nvGrpSpPr>
+        <p:cNvPr id="1" name=""/>
+        <p:cNvGrpSpPr/>
+        <p:nvPr/>
+      </p:nvGrpSpPr>
+      <p:grpSpPr>
+        <a:xfrm>
+          <a:off x="0" y="0"/>
+          <a:ext cx="0" cy="0"/>
+          <a:chOff x="0" y="0"/>
+          <a:chExt cx="0" cy="0"/>
+        </a:xfrm>
+      </p:grpSpPr>
+      <p:pic>
+        <p:nvPicPr>
+          <p:cNvPr id="2" name="Picture 1"/>
+          <p:cNvPicPr>
+            <a:picLocks noChangeAspect="1"/>
+          </p:cNvPicPr>
+          <p:nvPr/>
+        </p:nvPicPr>
+        <p:blipFill>
+          <a:blip r:embed="rId2"/>
+          <a:stretch>
+            <a:fillRect/>
+          </a:stretch>
+        </p:blipFill>
+        <p:spPr>
+          <a:xfrm>
+            <a:off x="1019175" y="1366837"/>
+            <a:ext cx="10287000" cy="4752975"/>
+          </a:xfrm>
+          <a:prstGeom prst="rect">
+            <a:avLst/>
+          </a:prstGeom>
+        </p:spPr>
+      </p:pic>
+    </p:spTree>
+    <p:extLst>
+      <p:ext uri="{BB962C8B-B14F-4D97-AF65-F5344CB8AC3E}">
+        <p14:creationId xmlns:p14="http://schemas.microsoft.com/office/powerpoint/2010/main" val="34522571"/>
+      </p:ext>
+    </p:extLst>
+  </p:cSld>
+  <p:clrMapOvr>
+    <a:masterClrMapping/>
+  </p:clrMapOvr>
+</p:sld>
+</file>
+
+<file path=ppt/slides/slide57.xml><?xml version="1.0" encoding="utf-8"?>
+<p:sld xmlns:a="http://schemas.openxmlformats.org/drawingml/2006/main" xmlns:r="http://schemas.openxmlformats.org/officeDocument/2006/relationships" xmlns:p="http://schemas.openxmlformats.org/presentationml/2006/main">
+  <p:cSld>
+    <p:spTree>
+      <p:nvGrpSpPr>
+        <p:cNvPr id="1" name=""/>
+        <p:cNvGrpSpPr/>
+        <p:nvPr/>
+      </p:nvGrpSpPr>
+      <p:grpSpPr>
+        <a:xfrm>
+          <a:off x="0" y="0"/>
+          <a:ext cx="0" cy="0"/>
+          <a:chOff x="0" y="0"/>
+          <a:chExt cx="0" cy="0"/>
+        </a:xfrm>
+      </p:grpSpPr>
+      <p:sp>
+        <p:nvSpPr>
+          <p:cNvPr id="3" name="TextBox 2"/>
+          <p:cNvSpPr txBox="1"/>
+          <p:nvPr/>
+        </p:nvSpPr>
+        <p:spPr>
+          <a:xfrm>
+            <a:off x="-96078" y="1304511"/>
+            <a:ext cx="11873948" cy="923330"/>
+          </a:xfrm>
+          <a:prstGeom prst="rect">
+            <a:avLst/>
+          </a:prstGeom>
+          <a:noFill/>
+        </p:spPr>
+        <p:txBody>
+          <a:bodyPr wrap="square" rtlCol="0">
+            <a:spAutoFit/>
+          </a:bodyPr>
+          <a:lstStyle/>
+          <a:p>
+            <a:pPr algn="ctr"/>
+            <a:r>
+              <a:rPr lang="en-IN" sz="5400" b="1" dirty="0">
+                <a:latin typeface="Verdana" panose="020B0604030504040204" pitchFamily="34" charset="0"/>
+                <a:ea typeface="Verdana" panose="020B0604030504040204" pitchFamily="34" charset="0"/>
+                <a:cs typeface="Verdana" panose="020B0604030504040204" pitchFamily="34" charset="0"/>
+              </a:rPr>
+              <a:t>Nested Components</a:t>
+            </a:r>
+          </a:p>
+        </p:txBody>
+      </p:sp>
+    </p:spTree>
+    <p:extLst>
+      <p:ext uri="{BB962C8B-B14F-4D97-AF65-F5344CB8AC3E}">
+        <p14:creationId xmlns:p14="http://schemas.microsoft.com/office/powerpoint/2010/main" val="607768105"/>
+      </p:ext>
+    </p:extLst>
+  </p:cSld>
+  <p:clrMapOvr>
+    <a:masterClrMapping/>
+  </p:clrMapOvr>
+</p:sld>
+</file>
+
+<file path=ppt/slides/slide58.xml><?xml version="1.0" encoding="utf-8"?>
+<p:sld xmlns:a="http://schemas.openxmlformats.org/drawingml/2006/main" xmlns:r="http://schemas.openxmlformats.org/officeDocument/2006/relationships" xmlns:p="http://schemas.openxmlformats.org/presentationml/2006/main">
+  <p:cSld>
+    <p:spTree>
+      <p:nvGrpSpPr>
+        <p:cNvPr id="1" name=""/>
+        <p:cNvGrpSpPr/>
+        <p:nvPr/>
+      </p:nvGrpSpPr>
+      <p:grpSpPr>
+        <a:xfrm>
+          <a:off x="0" y="0"/>
+          <a:ext cx="0" cy="0"/>
+          <a:chOff x="0" y="0"/>
+          <a:chExt cx="0" cy="0"/>
+        </a:xfrm>
+      </p:grpSpPr>
+      <p:pic>
+        <p:nvPicPr>
+          <p:cNvPr id="2" name="Picture 1"/>
+          <p:cNvPicPr>
+            <a:picLocks noChangeAspect="1"/>
+          </p:cNvPicPr>
+          <p:nvPr/>
+        </p:nvPicPr>
+        <p:blipFill>
+          <a:blip r:embed="rId2"/>
+          <a:stretch>
+            <a:fillRect/>
+          </a:stretch>
+        </p:blipFill>
+        <p:spPr>
+          <a:xfrm>
+            <a:off x="1776412" y="619126"/>
+            <a:ext cx="8429625" cy="4953000"/>
+          </a:xfrm>
+          <a:prstGeom prst="rect">
+            <a:avLst/>
+          </a:prstGeom>
+        </p:spPr>
+      </p:pic>
+    </p:spTree>
+    <p:extLst>
+      <p:ext uri="{BB962C8B-B14F-4D97-AF65-F5344CB8AC3E}">
+        <p14:creationId xmlns:p14="http://schemas.microsoft.com/office/powerpoint/2010/main" val="2428302825"/>
+      </p:ext>
+    </p:extLst>
+  </p:cSld>
+  <p:clrMapOvr>
+    <a:masterClrMapping/>
+  </p:clrMapOvr>
+</p:sld>
+</file>
+
+<file path=ppt/slides/slide59.xml><?xml version="1.0" encoding="utf-8"?>
+<p:sld xmlns:a="http://schemas.openxmlformats.org/drawingml/2006/main" xmlns:r="http://schemas.openxmlformats.org/officeDocument/2006/relationships" xmlns:p="http://schemas.openxmlformats.org/presentationml/2006/main">
+  <p:cSld>
+    <p:spTree>
+      <p:nvGrpSpPr>
+        <p:cNvPr id="1" name=""/>
+        <p:cNvGrpSpPr/>
+        <p:nvPr/>
+      </p:nvGrpSpPr>
+      <p:grpSpPr>
+        <a:xfrm>
+          <a:off x="0" y="0"/>
+          <a:ext cx="0" cy="0"/>
+          <a:chOff x="0" y="0"/>
+          <a:chExt cx="0" cy="0"/>
+        </a:xfrm>
+      </p:grpSpPr>
+      <p:pic>
+        <p:nvPicPr>
+          <p:cNvPr id="3" name="Picture 2"/>
+          <p:cNvPicPr>
+            <a:picLocks noChangeAspect="1"/>
+          </p:cNvPicPr>
+          <p:nvPr/>
+        </p:nvPicPr>
+        <p:blipFill>
+          <a:blip r:embed="rId2"/>
+          <a:stretch>
+            <a:fillRect/>
+          </a:stretch>
+        </p:blipFill>
+        <p:spPr>
+          <a:xfrm>
+            <a:off x="1466850" y="819150"/>
+            <a:ext cx="9163050" cy="4895850"/>
+          </a:xfrm>
+          <a:prstGeom prst="rect">
+            <a:avLst/>
+          </a:prstGeom>
+        </p:spPr>
+      </p:pic>
+    </p:spTree>
+    <p:extLst>
+      <p:ext uri="{BB962C8B-B14F-4D97-AF65-F5344CB8AC3E}">
+        <p14:creationId xmlns:p14="http://schemas.microsoft.com/office/powerpoint/2010/main" val="2753374662"/>
+      </p:ext>
+    </p:extLst>
+  </p:cSld>
+  <p:clrMapOvr>
+    <a:masterClrMapping/>
+  </p:clrMapOvr>
+</p:sld>
+</file>
+
 <file path=ppt/slides/slide6.xml><?xml version="1.0" encoding="utf-8"?>
 <p:sld xmlns:a="http://schemas.openxmlformats.org/drawingml/2006/main" xmlns:r="http://schemas.openxmlformats.org/officeDocument/2006/relationships" xmlns:p="http://schemas.openxmlformats.org/presentationml/2006/main">
   <p:cSld>
@@ -8716,6 +9965,699 @@
     <p:extLst>
       <p:ext uri="{BB962C8B-B14F-4D97-AF65-F5344CB8AC3E}">
         <p14:creationId xmlns:p14="http://schemas.microsoft.com/office/powerpoint/2010/main" val="1572302191"/>
+      </p:ext>
+    </p:extLst>
+  </p:cSld>
+  <p:clrMapOvr>
+    <a:masterClrMapping/>
+  </p:clrMapOvr>
+</p:sld>
+</file>
+
+<file path=ppt/slides/slide60.xml><?xml version="1.0" encoding="utf-8"?>
+<p:sld xmlns:a="http://schemas.openxmlformats.org/drawingml/2006/main" xmlns:r="http://schemas.openxmlformats.org/officeDocument/2006/relationships" xmlns:p="http://schemas.openxmlformats.org/presentationml/2006/main">
+  <p:cSld>
+    <p:spTree>
+      <p:nvGrpSpPr>
+        <p:cNvPr id="1" name=""/>
+        <p:cNvGrpSpPr/>
+        <p:nvPr/>
+      </p:nvGrpSpPr>
+      <p:grpSpPr>
+        <a:xfrm>
+          <a:off x="0" y="0"/>
+          <a:ext cx="0" cy="0"/>
+          <a:chOff x="0" y="0"/>
+          <a:chExt cx="0" cy="0"/>
+        </a:xfrm>
+      </p:grpSpPr>
+      <p:pic>
+        <p:nvPicPr>
+          <p:cNvPr id="2" name="Picture 1"/>
+          <p:cNvPicPr>
+            <a:picLocks noChangeAspect="1"/>
+          </p:cNvPicPr>
+          <p:nvPr/>
+        </p:nvPicPr>
+        <p:blipFill>
+          <a:blip r:embed="rId2"/>
+          <a:stretch>
+            <a:fillRect/>
+          </a:stretch>
+        </p:blipFill>
+        <p:spPr>
+          <a:xfrm>
+            <a:off x="1090613" y="1438275"/>
+            <a:ext cx="10167938" cy="4810125"/>
+          </a:xfrm>
+          <a:prstGeom prst="rect">
+            <a:avLst/>
+          </a:prstGeom>
+        </p:spPr>
+      </p:pic>
+    </p:spTree>
+    <p:extLst>
+      <p:ext uri="{BB962C8B-B14F-4D97-AF65-F5344CB8AC3E}">
+        <p14:creationId xmlns:p14="http://schemas.microsoft.com/office/powerpoint/2010/main" val="3538196214"/>
+      </p:ext>
+    </p:extLst>
+  </p:cSld>
+  <p:clrMapOvr>
+    <a:masterClrMapping/>
+  </p:clrMapOvr>
+</p:sld>
+</file>
+
+<file path=ppt/slides/slide61.xml><?xml version="1.0" encoding="utf-8"?>
+<p:sld xmlns:a="http://schemas.openxmlformats.org/drawingml/2006/main" xmlns:r="http://schemas.openxmlformats.org/officeDocument/2006/relationships" xmlns:p="http://schemas.openxmlformats.org/presentationml/2006/main">
+  <p:cSld>
+    <p:spTree>
+      <p:nvGrpSpPr>
+        <p:cNvPr id="1" name=""/>
+        <p:cNvGrpSpPr/>
+        <p:nvPr/>
+      </p:nvGrpSpPr>
+      <p:grpSpPr>
+        <a:xfrm>
+          <a:off x="0" y="0"/>
+          <a:ext cx="0" cy="0"/>
+          <a:chOff x="0" y="0"/>
+          <a:chExt cx="0" cy="0"/>
+        </a:xfrm>
+      </p:grpSpPr>
+      <p:pic>
+        <p:nvPicPr>
+          <p:cNvPr id="3" name="Picture 2"/>
+          <p:cNvPicPr>
+            <a:picLocks noChangeAspect="1"/>
+          </p:cNvPicPr>
+          <p:nvPr/>
+        </p:nvPicPr>
+        <p:blipFill>
+          <a:blip r:embed="rId2"/>
+          <a:stretch>
+            <a:fillRect/>
+          </a:stretch>
+        </p:blipFill>
+        <p:spPr>
+          <a:xfrm>
+            <a:off x="2628900" y="1333500"/>
+            <a:ext cx="5676900" cy="4876800"/>
+          </a:xfrm>
+          <a:prstGeom prst="rect">
+            <a:avLst/>
+          </a:prstGeom>
+        </p:spPr>
+      </p:pic>
+    </p:spTree>
+    <p:extLst>
+      <p:ext uri="{BB962C8B-B14F-4D97-AF65-F5344CB8AC3E}">
+        <p14:creationId xmlns:p14="http://schemas.microsoft.com/office/powerpoint/2010/main" val="609346345"/>
+      </p:ext>
+    </p:extLst>
+  </p:cSld>
+  <p:clrMapOvr>
+    <a:masterClrMapping/>
+  </p:clrMapOvr>
+</p:sld>
+</file>
+
+<file path=ppt/slides/slide62.xml><?xml version="1.0" encoding="utf-8"?>
+<p:sld xmlns:a="http://schemas.openxmlformats.org/drawingml/2006/main" xmlns:r="http://schemas.openxmlformats.org/officeDocument/2006/relationships" xmlns:p="http://schemas.openxmlformats.org/presentationml/2006/main">
+  <p:cSld>
+    <p:spTree>
+      <p:nvGrpSpPr>
+        <p:cNvPr id="1" name=""/>
+        <p:cNvGrpSpPr/>
+        <p:nvPr/>
+      </p:nvGrpSpPr>
+      <p:grpSpPr>
+        <a:xfrm>
+          <a:off x="0" y="0"/>
+          <a:ext cx="0" cy="0"/>
+          <a:chOff x="0" y="0"/>
+          <a:chExt cx="0" cy="0"/>
+        </a:xfrm>
+      </p:grpSpPr>
+      <p:sp>
+        <p:nvSpPr>
+          <p:cNvPr id="3" name="TextBox 2"/>
+          <p:cNvSpPr txBox="1"/>
+          <p:nvPr/>
+        </p:nvSpPr>
+        <p:spPr>
+          <a:xfrm>
+            <a:off x="132522" y="1285461"/>
+            <a:ext cx="11873948" cy="923330"/>
+          </a:xfrm>
+          <a:prstGeom prst="rect">
+            <a:avLst/>
+          </a:prstGeom>
+          <a:noFill/>
+        </p:spPr>
+        <p:txBody>
+          <a:bodyPr wrap="square" rtlCol="0">
+            <a:spAutoFit/>
+          </a:bodyPr>
+          <a:lstStyle/>
+          <a:p>
+            <a:pPr algn="ctr"/>
+            <a:r>
+              <a:rPr lang="en-IN" sz="5400" b="1" dirty="0">
+                <a:latin typeface="Verdana" panose="020B0604030504040204" pitchFamily="34" charset="0"/>
+                <a:ea typeface="Verdana" panose="020B0604030504040204" pitchFamily="34" charset="0"/>
+                <a:cs typeface="Verdana" panose="020B0604030504040204" pitchFamily="34" charset="0"/>
+              </a:rPr>
+              <a:t>Services</a:t>
+            </a:r>
+          </a:p>
+        </p:txBody>
+      </p:sp>
+      <p:sp>
+        <p:nvSpPr>
+          <p:cNvPr id="4" name="TextBox 3"/>
+          <p:cNvSpPr txBox="1"/>
+          <p:nvPr/>
+        </p:nvSpPr>
+        <p:spPr>
+          <a:xfrm>
+            <a:off x="974035" y="2498036"/>
+            <a:ext cx="10190921" cy="1323439"/>
+          </a:xfrm>
+          <a:prstGeom prst="rect">
+            <a:avLst/>
+          </a:prstGeom>
+          <a:noFill/>
+        </p:spPr>
+        <p:txBody>
+          <a:bodyPr wrap="square" rtlCol="0">
+            <a:spAutoFit/>
+          </a:bodyPr>
+          <a:lstStyle/>
+          <a:p>
+            <a:pPr algn="ctr"/>
+            <a:r>
+              <a:rPr lang="en-IN" sz="4000" dirty="0"/>
+              <a:t>Services in Angular 2 are simply </a:t>
+            </a:r>
+            <a:r>
+              <a:rPr lang="en-IN" sz="4000" dirty="0">
+                <a:solidFill>
+                  <a:schemeClr val="bg1"/>
+                </a:solidFill>
+              </a:rPr>
+              <a:t>ES2015 classes</a:t>
+            </a:r>
+            <a:r>
+              <a:rPr lang="en-IN" sz="4000" dirty="0"/>
+              <a:t>.</a:t>
+            </a:r>
+          </a:p>
+        </p:txBody>
+      </p:sp>
+    </p:spTree>
+    <p:extLst>
+      <p:ext uri="{BB962C8B-B14F-4D97-AF65-F5344CB8AC3E}">
+        <p14:creationId xmlns:p14="http://schemas.microsoft.com/office/powerpoint/2010/main" val="4102799822"/>
+      </p:ext>
+    </p:extLst>
+  </p:cSld>
+  <p:clrMapOvr>
+    <a:masterClrMapping/>
+  </p:clrMapOvr>
+</p:sld>
+</file>
+
+<file path=ppt/slides/slide63.xml><?xml version="1.0" encoding="utf-8"?>
+<p:sld xmlns:a="http://schemas.openxmlformats.org/drawingml/2006/main" xmlns:r="http://schemas.openxmlformats.org/officeDocument/2006/relationships" xmlns:p="http://schemas.openxmlformats.org/presentationml/2006/main">
+  <p:cSld>
+    <p:spTree>
+      <p:nvGrpSpPr>
+        <p:cNvPr id="1" name=""/>
+        <p:cNvGrpSpPr/>
+        <p:nvPr/>
+      </p:nvGrpSpPr>
+      <p:grpSpPr>
+        <a:xfrm>
+          <a:off x="0" y="0"/>
+          <a:ext cx="0" cy="0"/>
+          <a:chOff x="0" y="0"/>
+          <a:chExt cx="0" cy="0"/>
+        </a:xfrm>
+      </p:grpSpPr>
+      <p:pic>
+        <p:nvPicPr>
+          <p:cNvPr id="5" name="Picture 4"/>
+          <p:cNvPicPr>
+            <a:picLocks noChangeAspect="1"/>
+          </p:cNvPicPr>
+          <p:nvPr/>
+        </p:nvPicPr>
+        <p:blipFill>
+          <a:blip r:embed="rId2"/>
+          <a:stretch>
+            <a:fillRect/>
+          </a:stretch>
+        </p:blipFill>
+        <p:spPr>
+          <a:xfrm>
+            <a:off x="1781175" y="885825"/>
+            <a:ext cx="8629650" cy="5086350"/>
+          </a:xfrm>
+          <a:prstGeom prst="rect">
+            <a:avLst/>
+          </a:prstGeom>
+        </p:spPr>
+      </p:pic>
+    </p:spTree>
+    <p:extLst>
+      <p:ext uri="{BB962C8B-B14F-4D97-AF65-F5344CB8AC3E}">
+        <p14:creationId xmlns:p14="http://schemas.microsoft.com/office/powerpoint/2010/main" val="441167698"/>
+      </p:ext>
+    </p:extLst>
+  </p:cSld>
+  <p:clrMapOvr>
+    <a:masterClrMapping/>
+  </p:clrMapOvr>
+</p:sld>
+</file>
+
+<file path=ppt/slides/slide64.xml><?xml version="1.0" encoding="utf-8"?>
+<p:sld xmlns:a="http://schemas.openxmlformats.org/drawingml/2006/main" xmlns:r="http://schemas.openxmlformats.org/officeDocument/2006/relationships" xmlns:p="http://schemas.openxmlformats.org/presentationml/2006/main">
+  <p:cSld>
+    <p:spTree>
+      <p:nvGrpSpPr>
+        <p:cNvPr id="1" name=""/>
+        <p:cNvGrpSpPr/>
+        <p:nvPr/>
+      </p:nvGrpSpPr>
+      <p:grpSpPr>
+        <a:xfrm>
+          <a:off x="0" y="0"/>
+          <a:ext cx="0" cy="0"/>
+          <a:chOff x="0" y="0"/>
+          <a:chExt cx="0" cy="0"/>
+        </a:xfrm>
+      </p:grpSpPr>
+      <p:pic>
+        <p:nvPicPr>
+          <p:cNvPr id="2" name="Picture 1"/>
+          <p:cNvPicPr>
+            <a:picLocks noChangeAspect="1"/>
+          </p:cNvPicPr>
+          <p:nvPr/>
+        </p:nvPicPr>
+        <p:blipFill>
+          <a:blip r:embed="rId2"/>
+          <a:stretch>
+            <a:fillRect/>
+          </a:stretch>
+        </p:blipFill>
+        <p:spPr>
+          <a:xfrm>
+            <a:off x="1771650" y="1057275"/>
+            <a:ext cx="8648700" cy="4743450"/>
+          </a:xfrm>
+          <a:prstGeom prst="rect">
+            <a:avLst/>
+          </a:prstGeom>
+        </p:spPr>
+      </p:pic>
+    </p:spTree>
+    <p:extLst>
+      <p:ext uri="{BB962C8B-B14F-4D97-AF65-F5344CB8AC3E}">
+        <p14:creationId xmlns:p14="http://schemas.microsoft.com/office/powerpoint/2010/main" val="3915432716"/>
+      </p:ext>
+    </p:extLst>
+  </p:cSld>
+  <p:clrMapOvr>
+    <a:masterClrMapping/>
+  </p:clrMapOvr>
+</p:sld>
+</file>
+
+<file path=ppt/slides/slide65.xml><?xml version="1.0" encoding="utf-8"?>
+<p:sld xmlns:a="http://schemas.openxmlformats.org/drawingml/2006/main" xmlns:r="http://schemas.openxmlformats.org/officeDocument/2006/relationships" xmlns:p="http://schemas.openxmlformats.org/presentationml/2006/main">
+  <p:cSld>
+    <p:spTree>
+      <p:nvGrpSpPr>
+        <p:cNvPr id="1" name=""/>
+        <p:cNvGrpSpPr/>
+        <p:nvPr/>
+      </p:nvGrpSpPr>
+      <p:grpSpPr>
+        <a:xfrm>
+          <a:off x="0" y="0"/>
+          <a:ext cx="0" cy="0"/>
+          <a:chOff x="0" y="0"/>
+          <a:chExt cx="0" cy="0"/>
+        </a:xfrm>
+      </p:grpSpPr>
+      <p:pic>
+        <p:nvPicPr>
+          <p:cNvPr id="3" name="Picture 2"/>
+          <p:cNvPicPr>
+            <a:picLocks noChangeAspect="1"/>
+          </p:cNvPicPr>
+          <p:nvPr/>
+        </p:nvPicPr>
+        <p:blipFill>
+          <a:blip r:embed="rId2"/>
+          <a:stretch>
+            <a:fillRect/>
+          </a:stretch>
+        </p:blipFill>
+        <p:spPr>
+          <a:xfrm>
+            <a:off x="1209675" y="1447800"/>
+            <a:ext cx="9391649" cy="4238624"/>
+          </a:xfrm>
+          <a:prstGeom prst="rect">
+            <a:avLst/>
+          </a:prstGeom>
+        </p:spPr>
+      </p:pic>
+    </p:spTree>
+    <p:extLst>
+      <p:ext uri="{BB962C8B-B14F-4D97-AF65-F5344CB8AC3E}">
+        <p14:creationId xmlns:p14="http://schemas.microsoft.com/office/powerpoint/2010/main" val="3688417437"/>
+      </p:ext>
+    </p:extLst>
+  </p:cSld>
+  <p:clrMapOvr>
+    <a:masterClrMapping/>
+  </p:clrMapOvr>
+</p:sld>
+</file>
+
+<file path=ppt/slides/slide66.xml><?xml version="1.0" encoding="utf-8"?>
+<p:sld xmlns:a="http://schemas.openxmlformats.org/drawingml/2006/main" xmlns:r="http://schemas.openxmlformats.org/officeDocument/2006/relationships" xmlns:p="http://schemas.openxmlformats.org/presentationml/2006/main">
+  <p:cSld>
+    <p:spTree>
+      <p:nvGrpSpPr>
+        <p:cNvPr id="1" name=""/>
+        <p:cNvGrpSpPr/>
+        <p:nvPr/>
+      </p:nvGrpSpPr>
+      <p:grpSpPr>
+        <a:xfrm>
+          <a:off x="0" y="0"/>
+          <a:ext cx="0" cy="0"/>
+          <a:chOff x="0" y="0"/>
+          <a:chExt cx="0" cy="0"/>
+        </a:xfrm>
+      </p:grpSpPr>
+      <p:pic>
+        <p:nvPicPr>
+          <p:cNvPr id="4" name="Picture 3"/>
+          <p:cNvPicPr>
+            <a:picLocks noChangeAspect="1"/>
+          </p:cNvPicPr>
+          <p:nvPr/>
+        </p:nvPicPr>
+        <p:blipFill>
+          <a:blip r:embed="rId2"/>
+          <a:stretch>
+            <a:fillRect/>
+          </a:stretch>
+        </p:blipFill>
+        <p:spPr>
+          <a:xfrm>
+            <a:off x="2628900" y="1333500"/>
+            <a:ext cx="5676900" cy="4876800"/>
+          </a:xfrm>
+          <a:prstGeom prst="rect">
+            <a:avLst/>
+          </a:prstGeom>
+        </p:spPr>
+      </p:pic>
+    </p:spTree>
+    <p:extLst>
+      <p:ext uri="{BB962C8B-B14F-4D97-AF65-F5344CB8AC3E}">
+        <p14:creationId xmlns:p14="http://schemas.microsoft.com/office/powerpoint/2010/main" val="3865551732"/>
+      </p:ext>
+    </p:extLst>
+  </p:cSld>
+  <p:clrMapOvr>
+    <a:masterClrMapping/>
+  </p:clrMapOvr>
+</p:sld>
+</file>
+
+<file path=ppt/slides/slide67.xml><?xml version="1.0" encoding="utf-8"?>
+<p:sld xmlns:a="http://schemas.openxmlformats.org/drawingml/2006/main" xmlns:r="http://schemas.openxmlformats.org/officeDocument/2006/relationships" xmlns:p="http://schemas.openxmlformats.org/presentationml/2006/main">
+  <p:cSld>
+    <p:spTree>
+      <p:nvGrpSpPr>
+        <p:cNvPr id="1" name=""/>
+        <p:cNvGrpSpPr/>
+        <p:nvPr/>
+      </p:nvGrpSpPr>
+      <p:grpSpPr>
+        <a:xfrm>
+          <a:off x="0" y="0"/>
+          <a:ext cx="0" cy="0"/>
+          <a:chOff x="0" y="0"/>
+          <a:chExt cx="0" cy="0"/>
+        </a:xfrm>
+      </p:grpSpPr>
+      <p:sp>
+        <p:nvSpPr>
+          <p:cNvPr id="3" name="TextBox 2"/>
+          <p:cNvSpPr txBox="1"/>
+          <p:nvPr/>
+        </p:nvSpPr>
+        <p:spPr>
+          <a:xfrm>
+            <a:off x="-144531" y="716032"/>
+            <a:ext cx="11873948" cy="923330"/>
+          </a:xfrm>
+          <a:prstGeom prst="rect">
+            <a:avLst/>
+          </a:prstGeom>
+          <a:noFill/>
+        </p:spPr>
+        <p:txBody>
+          <a:bodyPr wrap="square" rtlCol="0">
+            <a:spAutoFit/>
+          </a:bodyPr>
+          <a:lstStyle/>
+          <a:p>
+            <a:pPr algn="ctr"/>
+            <a:r>
+              <a:rPr lang="en-IN" sz="5400" b="1" dirty="0">
+                <a:latin typeface="Verdana" panose="020B0604030504040204" pitchFamily="34" charset="0"/>
+                <a:ea typeface="Verdana" panose="020B0604030504040204" pitchFamily="34" charset="0"/>
+                <a:cs typeface="Verdana" panose="020B0604030504040204" pitchFamily="34" charset="0"/>
+              </a:rPr>
+              <a:t>Navigation and Routing</a:t>
+            </a:r>
+          </a:p>
+        </p:txBody>
+      </p:sp>
+    </p:spTree>
+    <p:extLst>
+      <p:ext uri="{BB962C8B-B14F-4D97-AF65-F5344CB8AC3E}">
+        <p14:creationId xmlns:p14="http://schemas.microsoft.com/office/powerpoint/2010/main" val="2005845410"/>
+      </p:ext>
+    </p:extLst>
+  </p:cSld>
+  <p:clrMapOvr>
+    <a:masterClrMapping/>
+  </p:clrMapOvr>
+</p:sld>
+</file>
+
+<file path=ppt/slides/slide68.xml><?xml version="1.0" encoding="utf-8"?>
+<p:sld xmlns:a="http://schemas.openxmlformats.org/drawingml/2006/main" xmlns:r="http://schemas.openxmlformats.org/officeDocument/2006/relationships" xmlns:p="http://schemas.openxmlformats.org/presentationml/2006/main">
+  <p:cSld>
+    <p:spTree>
+      <p:nvGrpSpPr>
+        <p:cNvPr id="1" name=""/>
+        <p:cNvGrpSpPr/>
+        <p:nvPr/>
+      </p:nvGrpSpPr>
+      <p:grpSpPr>
+        <a:xfrm>
+          <a:off x="0" y="0"/>
+          <a:ext cx="0" cy="0"/>
+          <a:chOff x="0" y="0"/>
+          <a:chExt cx="0" cy="0"/>
+        </a:xfrm>
+      </p:grpSpPr>
+      <p:pic>
+        <p:nvPicPr>
+          <p:cNvPr id="2" name="Picture 1"/>
+          <p:cNvPicPr>
+            <a:picLocks noChangeAspect="1"/>
+          </p:cNvPicPr>
+          <p:nvPr/>
+        </p:nvPicPr>
+        <p:blipFill>
+          <a:blip r:embed="rId2"/>
+          <a:stretch>
+            <a:fillRect/>
+          </a:stretch>
+        </p:blipFill>
+        <p:spPr>
+          <a:xfrm>
+            <a:off x="686627" y="318052"/>
+            <a:ext cx="5290103" cy="6334539"/>
+          </a:xfrm>
+          <a:prstGeom prst="rect">
+            <a:avLst/>
+          </a:prstGeom>
+        </p:spPr>
+      </p:pic>
+      <p:pic>
+        <p:nvPicPr>
+          <p:cNvPr id="5" name="Picture 4"/>
+          <p:cNvPicPr>
+            <a:picLocks noChangeAspect="1"/>
+          </p:cNvPicPr>
+          <p:nvPr/>
+        </p:nvPicPr>
+        <p:blipFill>
+          <a:blip r:embed="rId3"/>
+          <a:stretch>
+            <a:fillRect/>
+          </a:stretch>
+        </p:blipFill>
+        <p:spPr>
+          <a:xfrm>
+            <a:off x="7328452" y="318052"/>
+            <a:ext cx="4388954" cy="5009322"/>
+          </a:xfrm>
+          <a:prstGeom prst="rect">
+            <a:avLst/>
+          </a:prstGeom>
+        </p:spPr>
+      </p:pic>
+    </p:spTree>
+    <p:extLst>
+      <p:ext uri="{BB962C8B-B14F-4D97-AF65-F5344CB8AC3E}">
+        <p14:creationId xmlns:p14="http://schemas.microsoft.com/office/powerpoint/2010/main" val="2105288684"/>
+      </p:ext>
+    </p:extLst>
+  </p:cSld>
+  <p:clrMapOvr>
+    <a:masterClrMapping/>
+  </p:clrMapOvr>
+</p:sld>
+</file>
+
+<file path=ppt/slides/slide69.xml><?xml version="1.0" encoding="utf-8"?>
+<p:sld xmlns:a="http://schemas.openxmlformats.org/drawingml/2006/main" xmlns:r="http://schemas.openxmlformats.org/officeDocument/2006/relationships" xmlns:p="http://schemas.openxmlformats.org/presentationml/2006/main">
+  <p:cSld>
+    <p:spTree>
+      <p:nvGrpSpPr>
+        <p:cNvPr id="1" name=""/>
+        <p:cNvGrpSpPr/>
+        <p:nvPr/>
+      </p:nvGrpSpPr>
+      <p:grpSpPr>
+        <a:xfrm>
+          <a:off x="0" y="0"/>
+          <a:ext cx="0" cy="0"/>
+          <a:chOff x="0" y="0"/>
+          <a:chExt cx="0" cy="0"/>
+        </a:xfrm>
+      </p:grpSpPr>
+      <p:sp>
+        <p:nvSpPr>
+          <p:cNvPr id="4" name="TextBox 3"/>
+          <p:cNvSpPr txBox="1"/>
+          <p:nvPr/>
+        </p:nvSpPr>
+        <p:spPr>
+          <a:xfrm>
+            <a:off x="410816" y="516835"/>
+            <a:ext cx="10164419" cy="707886"/>
+          </a:xfrm>
+          <a:prstGeom prst="rect">
+            <a:avLst/>
+          </a:prstGeom>
+          <a:noFill/>
+        </p:spPr>
+        <p:txBody>
+          <a:bodyPr wrap="square" rtlCol="0">
+            <a:spAutoFit/>
+          </a:bodyPr>
+          <a:lstStyle/>
+          <a:p>
+            <a:r>
+              <a:rPr lang="en-IN" sz="4000" b="1" dirty="0"/>
+              <a:t>What components do we have ?</a:t>
+            </a:r>
+          </a:p>
+        </p:txBody>
+      </p:sp>
+      <p:sp>
+        <p:nvSpPr>
+          <p:cNvPr id="6" name="TextBox 5"/>
+          <p:cNvSpPr txBox="1"/>
+          <p:nvPr/>
+        </p:nvSpPr>
+        <p:spPr>
+          <a:xfrm>
+            <a:off x="410816" y="1669775"/>
+            <a:ext cx="11449880" cy="2769989"/>
+          </a:xfrm>
+          <a:prstGeom prst="rect">
+            <a:avLst/>
+          </a:prstGeom>
+          <a:noFill/>
+        </p:spPr>
+        <p:txBody>
+          <a:bodyPr wrap="square" rtlCol="0">
+            <a:spAutoFit/>
+          </a:bodyPr>
+          <a:lstStyle/>
+          <a:p>
+            <a:r>
+              <a:rPr lang="en-IN" sz="2900" b="1" dirty="0"/>
+              <a:t>AppComponent</a:t>
+            </a:r>
+            <a:r>
+              <a:rPr lang="en-IN" sz="2900" dirty="0"/>
+              <a:t> – The root component.</a:t>
+            </a:r>
+            <a:br>
+              <a:rPr lang="en-IN" sz="2900" dirty="0"/>
+            </a:br>
+            <a:br>
+              <a:rPr lang="en-IN" sz="2900" dirty="0"/>
+            </a:br>
+            <a:r>
+              <a:rPr lang="en-IN" sz="2900" b="1" dirty="0"/>
+              <a:t>ContactListComponent</a:t>
+            </a:r>
+            <a:r>
+              <a:rPr lang="en-IN" sz="2900" dirty="0"/>
+              <a:t> – A component to list all contacts </a:t>
+            </a:r>
+            <a:br>
+              <a:rPr lang="en-IN" sz="2900" dirty="0"/>
+            </a:br>
+            <a:br>
+              <a:rPr lang="en-IN" sz="2900" dirty="0"/>
+            </a:br>
+            <a:r>
+              <a:rPr lang="en-IN" sz="2900" b="1" dirty="0"/>
+              <a:t>ContactDetailComponent</a:t>
+            </a:r>
+            <a:r>
+              <a:rPr lang="en-IN" sz="2900" dirty="0"/>
+              <a:t>  -  A component to show a contact’s details</a:t>
+            </a:r>
+            <a:endParaRPr lang="en-IN" sz="2900" dirty="0"/>
+          </a:p>
+        </p:txBody>
+      </p:sp>
+    </p:spTree>
+    <p:extLst>
+      <p:ext uri="{BB962C8B-B14F-4D97-AF65-F5344CB8AC3E}">
+        <p14:creationId xmlns:p14="http://schemas.microsoft.com/office/powerpoint/2010/main" val="4190037637"/>
       </p:ext>
     </p:extLst>
   </p:cSld>
@@ -8770,6 +10712,506 @@
     <p:extLst>
       <p:ext uri="{BB962C8B-B14F-4D97-AF65-F5344CB8AC3E}">
         <p14:creationId xmlns:p14="http://schemas.microsoft.com/office/powerpoint/2010/main" val="1995603616"/>
+      </p:ext>
+    </p:extLst>
+  </p:cSld>
+  <p:clrMapOvr>
+    <a:masterClrMapping/>
+  </p:clrMapOvr>
+</p:sld>
+</file>
+
+<file path=ppt/slides/slide70.xml><?xml version="1.0" encoding="utf-8"?>
+<p:sld xmlns:a="http://schemas.openxmlformats.org/drawingml/2006/main" xmlns:r="http://schemas.openxmlformats.org/officeDocument/2006/relationships" xmlns:p="http://schemas.openxmlformats.org/presentationml/2006/main">
+  <p:cSld>
+    <p:spTree>
+      <p:nvGrpSpPr>
+        <p:cNvPr id="1" name=""/>
+        <p:cNvGrpSpPr/>
+        <p:nvPr/>
+      </p:nvGrpSpPr>
+      <p:grpSpPr>
+        <a:xfrm>
+          <a:off x="0" y="0"/>
+          <a:ext cx="0" cy="0"/>
+          <a:chOff x="0" y="0"/>
+          <a:chExt cx="0" cy="0"/>
+        </a:xfrm>
+      </p:grpSpPr>
+      <p:pic>
+        <p:nvPicPr>
+          <p:cNvPr id="2" name="Picture 1"/>
+          <p:cNvPicPr>
+            <a:picLocks noChangeAspect="1"/>
+          </p:cNvPicPr>
+          <p:nvPr/>
+        </p:nvPicPr>
+        <p:blipFill>
+          <a:blip r:embed="rId2"/>
+          <a:stretch>
+            <a:fillRect/>
+          </a:stretch>
+        </p:blipFill>
+        <p:spPr>
+          <a:xfrm>
+            <a:off x="543339" y="636104"/>
+            <a:ext cx="11145078" cy="5950226"/>
+          </a:xfrm>
+          <a:prstGeom prst="rect">
+            <a:avLst/>
+          </a:prstGeom>
+        </p:spPr>
+      </p:pic>
+    </p:spTree>
+    <p:extLst>
+      <p:ext uri="{BB962C8B-B14F-4D97-AF65-F5344CB8AC3E}">
+        <p14:creationId xmlns:p14="http://schemas.microsoft.com/office/powerpoint/2010/main" val="1424634413"/>
+      </p:ext>
+    </p:extLst>
+  </p:cSld>
+  <p:clrMapOvr>
+    <a:masterClrMapping/>
+  </p:clrMapOvr>
+</p:sld>
+</file>
+
+<file path=ppt/slides/slide71.xml><?xml version="1.0" encoding="utf-8"?>
+<p:sld xmlns:a="http://schemas.openxmlformats.org/drawingml/2006/main" xmlns:r="http://schemas.openxmlformats.org/officeDocument/2006/relationships" xmlns:p="http://schemas.openxmlformats.org/presentationml/2006/main">
+  <p:cSld>
+    <p:spTree>
+      <p:nvGrpSpPr>
+        <p:cNvPr id="1" name=""/>
+        <p:cNvGrpSpPr/>
+        <p:nvPr/>
+      </p:nvGrpSpPr>
+      <p:grpSpPr>
+        <a:xfrm>
+          <a:off x="0" y="0"/>
+          <a:ext cx="0" cy="0"/>
+          <a:chOff x="0" y="0"/>
+          <a:chExt cx="0" cy="0"/>
+        </a:xfrm>
+      </p:grpSpPr>
+      <p:pic>
+        <p:nvPicPr>
+          <p:cNvPr id="3" name="Picture 2"/>
+          <p:cNvPicPr>
+            <a:picLocks noChangeAspect="1"/>
+          </p:cNvPicPr>
+          <p:nvPr/>
+        </p:nvPicPr>
+        <p:blipFill>
+          <a:blip r:embed="rId2"/>
+          <a:stretch>
+            <a:fillRect/>
+          </a:stretch>
+        </p:blipFill>
+        <p:spPr>
+          <a:xfrm>
+            <a:off x="661365" y="735495"/>
+            <a:ext cx="5288861" cy="6122505"/>
+          </a:xfrm>
+          <a:prstGeom prst="rect">
+            <a:avLst/>
+          </a:prstGeom>
+        </p:spPr>
+      </p:pic>
+      <p:sp>
+        <p:nvSpPr>
+          <p:cNvPr id="4" name="TextBox 3"/>
+          <p:cNvSpPr txBox="1"/>
+          <p:nvPr/>
+        </p:nvSpPr>
+        <p:spPr>
+          <a:xfrm>
+            <a:off x="543340" y="159026"/>
+            <a:ext cx="3790122" cy="523220"/>
+          </a:xfrm>
+          <a:prstGeom prst="rect">
+            <a:avLst/>
+          </a:prstGeom>
+          <a:noFill/>
+        </p:spPr>
+        <p:txBody>
+          <a:bodyPr wrap="square" rtlCol="0">
+            <a:spAutoFit/>
+          </a:bodyPr>
+          <a:lstStyle/>
+          <a:p>
+            <a:r>
+              <a:rPr lang="en-IN" sz="2800" b="1" dirty="0"/>
+              <a:t>http://localhost:5000</a:t>
+            </a:r>
+          </a:p>
+        </p:txBody>
+      </p:sp>
+      <p:pic>
+        <p:nvPicPr>
+          <p:cNvPr id="5" name="Picture 4"/>
+          <p:cNvPicPr>
+            <a:picLocks noChangeAspect="1"/>
+          </p:cNvPicPr>
+          <p:nvPr/>
+        </p:nvPicPr>
+        <p:blipFill>
+          <a:blip r:embed="rId3"/>
+          <a:stretch>
+            <a:fillRect/>
+          </a:stretch>
+        </p:blipFill>
+        <p:spPr>
+          <a:xfrm>
+            <a:off x="6705601" y="682246"/>
+            <a:ext cx="4388954" cy="5009322"/>
+          </a:xfrm>
+          <a:prstGeom prst="rect">
+            <a:avLst/>
+          </a:prstGeom>
+        </p:spPr>
+      </p:pic>
+      <p:sp>
+        <p:nvSpPr>
+          <p:cNvPr id="6" name="TextBox 5"/>
+          <p:cNvSpPr txBox="1"/>
+          <p:nvPr/>
+        </p:nvSpPr>
+        <p:spPr>
+          <a:xfrm>
+            <a:off x="6579711" y="159026"/>
+            <a:ext cx="5453262" cy="523220"/>
+          </a:xfrm>
+          <a:prstGeom prst="rect">
+            <a:avLst/>
+          </a:prstGeom>
+          <a:noFill/>
+        </p:spPr>
+        <p:txBody>
+          <a:bodyPr wrap="square" rtlCol="0">
+            <a:spAutoFit/>
+          </a:bodyPr>
+          <a:lstStyle/>
+          <a:p>
+            <a:r>
+              <a:rPr lang="en-IN" sz="2800" b="1" dirty="0"/>
+              <a:t>http://localhost:5000/details/1</a:t>
+            </a:r>
+          </a:p>
+        </p:txBody>
+      </p:sp>
+    </p:spTree>
+    <p:extLst>
+      <p:ext uri="{BB962C8B-B14F-4D97-AF65-F5344CB8AC3E}">
+        <p14:creationId xmlns:p14="http://schemas.microsoft.com/office/powerpoint/2010/main" val="397850541"/>
+      </p:ext>
+    </p:extLst>
+  </p:cSld>
+  <p:clrMapOvr>
+    <a:masterClrMapping/>
+  </p:clrMapOvr>
+</p:sld>
+</file>
+
+<file path=ppt/slides/slide72.xml><?xml version="1.0" encoding="utf-8"?>
+<p:sld xmlns:a="http://schemas.openxmlformats.org/drawingml/2006/main" xmlns:r="http://schemas.openxmlformats.org/officeDocument/2006/relationships" xmlns:p="http://schemas.openxmlformats.org/presentationml/2006/main">
+  <p:cSld>
+    <p:spTree>
+      <p:nvGrpSpPr>
+        <p:cNvPr id="1" name=""/>
+        <p:cNvGrpSpPr/>
+        <p:nvPr/>
+      </p:nvGrpSpPr>
+      <p:grpSpPr>
+        <a:xfrm>
+          <a:off x="0" y="0"/>
+          <a:ext cx="0" cy="0"/>
+          <a:chOff x="0" y="0"/>
+          <a:chExt cx="0" cy="0"/>
+        </a:xfrm>
+      </p:grpSpPr>
+      <p:pic>
+        <p:nvPicPr>
+          <p:cNvPr id="4" name="Picture 3"/>
+          <p:cNvPicPr>
+            <a:picLocks noChangeAspect="1"/>
+          </p:cNvPicPr>
+          <p:nvPr/>
+        </p:nvPicPr>
+        <p:blipFill>
+          <a:blip r:embed="rId2"/>
+          <a:stretch>
+            <a:fillRect/>
+          </a:stretch>
+        </p:blipFill>
+        <p:spPr>
+          <a:xfrm>
+            <a:off x="795131" y="516835"/>
+            <a:ext cx="10548730" cy="6056243"/>
+          </a:xfrm>
+          <a:prstGeom prst="rect">
+            <a:avLst/>
+          </a:prstGeom>
+        </p:spPr>
+      </p:pic>
+    </p:spTree>
+    <p:extLst>
+      <p:ext uri="{BB962C8B-B14F-4D97-AF65-F5344CB8AC3E}">
+        <p14:creationId xmlns:p14="http://schemas.microsoft.com/office/powerpoint/2010/main" val="904768788"/>
+      </p:ext>
+    </p:extLst>
+  </p:cSld>
+  <p:clrMapOvr>
+    <a:masterClrMapping/>
+  </p:clrMapOvr>
+</p:sld>
+</file>
+
+<file path=ppt/slides/slide73.xml><?xml version="1.0" encoding="utf-8"?>
+<p:sld xmlns:a="http://schemas.openxmlformats.org/drawingml/2006/main" xmlns:r="http://schemas.openxmlformats.org/officeDocument/2006/relationships" xmlns:p="http://schemas.openxmlformats.org/presentationml/2006/main">
+  <p:cSld>
+    <p:spTree>
+      <p:nvGrpSpPr>
+        <p:cNvPr id="1" name=""/>
+        <p:cNvGrpSpPr/>
+        <p:nvPr/>
+      </p:nvGrpSpPr>
+      <p:grpSpPr>
+        <a:xfrm>
+          <a:off x="0" y="0"/>
+          <a:ext cx="0" cy="0"/>
+          <a:chOff x="0" y="0"/>
+          <a:chExt cx="0" cy="0"/>
+        </a:xfrm>
+      </p:grpSpPr>
+      <p:pic>
+        <p:nvPicPr>
+          <p:cNvPr id="2" name="Picture 1"/>
+          <p:cNvPicPr>
+            <a:picLocks noChangeAspect="1"/>
+          </p:cNvPicPr>
+          <p:nvPr/>
+        </p:nvPicPr>
+        <p:blipFill>
+          <a:blip r:embed="rId2"/>
+          <a:stretch>
+            <a:fillRect/>
+          </a:stretch>
+        </p:blipFill>
+        <p:spPr>
+          <a:xfrm>
+            <a:off x="463619" y="2531166"/>
+            <a:ext cx="11317564" cy="1444487"/>
+          </a:xfrm>
+          <a:prstGeom prst="rect">
+            <a:avLst/>
+          </a:prstGeom>
+        </p:spPr>
+      </p:pic>
+    </p:spTree>
+    <p:extLst>
+      <p:ext uri="{BB962C8B-B14F-4D97-AF65-F5344CB8AC3E}">
+        <p14:creationId xmlns:p14="http://schemas.microsoft.com/office/powerpoint/2010/main" val="2968588193"/>
+      </p:ext>
+    </p:extLst>
+  </p:cSld>
+  <p:clrMapOvr>
+    <a:masterClrMapping/>
+  </p:clrMapOvr>
+</p:sld>
+</file>
+
+<file path=ppt/slides/slide74.xml><?xml version="1.0" encoding="utf-8"?>
+<p:sld xmlns:a="http://schemas.openxmlformats.org/drawingml/2006/main" xmlns:r="http://schemas.openxmlformats.org/officeDocument/2006/relationships" xmlns:p="http://schemas.openxmlformats.org/presentationml/2006/main">
+  <p:cSld>
+    <p:spTree>
+      <p:nvGrpSpPr>
+        <p:cNvPr id="1" name=""/>
+        <p:cNvGrpSpPr/>
+        <p:nvPr/>
+      </p:nvGrpSpPr>
+      <p:grpSpPr>
+        <a:xfrm>
+          <a:off x="0" y="0"/>
+          <a:ext cx="0" cy="0"/>
+          <a:chOff x="0" y="0"/>
+          <a:chExt cx="0" cy="0"/>
+        </a:xfrm>
+      </p:grpSpPr>
+      <p:pic>
+        <p:nvPicPr>
+          <p:cNvPr id="3" name="Picture 2"/>
+          <p:cNvPicPr>
+            <a:picLocks noChangeAspect="1"/>
+          </p:cNvPicPr>
+          <p:nvPr/>
+        </p:nvPicPr>
+        <p:blipFill>
+          <a:blip r:embed="rId2"/>
+          <a:stretch>
+            <a:fillRect/>
+          </a:stretch>
+        </p:blipFill>
+        <p:spPr>
+          <a:xfrm>
+            <a:off x="1463744" y="1732928"/>
+            <a:ext cx="8124825" cy="1457325"/>
+          </a:xfrm>
+          <a:prstGeom prst="rect">
+            <a:avLst/>
+          </a:prstGeom>
+        </p:spPr>
+      </p:pic>
+    </p:spTree>
+    <p:extLst>
+      <p:ext uri="{BB962C8B-B14F-4D97-AF65-F5344CB8AC3E}">
+        <p14:creationId xmlns:p14="http://schemas.microsoft.com/office/powerpoint/2010/main" val="1379974998"/>
+      </p:ext>
+    </p:extLst>
+  </p:cSld>
+  <p:clrMapOvr>
+    <a:masterClrMapping/>
+  </p:clrMapOvr>
+</p:sld>
+</file>
+
+<file path=ppt/slides/slide75.xml><?xml version="1.0" encoding="utf-8"?>
+<p:sld xmlns:a="http://schemas.openxmlformats.org/drawingml/2006/main" xmlns:r="http://schemas.openxmlformats.org/officeDocument/2006/relationships" xmlns:p="http://schemas.openxmlformats.org/presentationml/2006/main">
+  <p:cSld>
+    <p:spTree>
+      <p:nvGrpSpPr>
+        <p:cNvPr id="1" name=""/>
+        <p:cNvGrpSpPr/>
+        <p:nvPr/>
+      </p:nvGrpSpPr>
+      <p:grpSpPr>
+        <a:xfrm>
+          <a:off x="0" y="0"/>
+          <a:ext cx="0" cy="0"/>
+          <a:chOff x="0" y="0"/>
+          <a:chExt cx="0" cy="0"/>
+        </a:xfrm>
+      </p:grpSpPr>
+      <p:pic>
+        <p:nvPicPr>
+          <p:cNvPr id="4" name="Picture 3"/>
+          <p:cNvPicPr>
+            <a:picLocks noChangeAspect="1"/>
+          </p:cNvPicPr>
+          <p:nvPr/>
+        </p:nvPicPr>
+        <p:blipFill>
+          <a:blip r:embed="rId2"/>
+          <a:stretch>
+            <a:fillRect/>
+          </a:stretch>
+        </p:blipFill>
+        <p:spPr>
+          <a:xfrm>
+            <a:off x="642109" y="437322"/>
+            <a:ext cx="10860778" cy="5967411"/>
+          </a:xfrm>
+          <a:prstGeom prst="rect">
+            <a:avLst/>
+          </a:prstGeom>
+        </p:spPr>
+      </p:pic>
+    </p:spTree>
+    <p:extLst>
+      <p:ext uri="{BB962C8B-B14F-4D97-AF65-F5344CB8AC3E}">
+        <p14:creationId xmlns:p14="http://schemas.microsoft.com/office/powerpoint/2010/main" val="4109346931"/>
+      </p:ext>
+    </p:extLst>
+  </p:cSld>
+  <p:clrMapOvr>
+    <a:masterClrMapping/>
+  </p:clrMapOvr>
+</p:sld>
+</file>
+
+<file path=ppt/slides/slide76.xml><?xml version="1.0" encoding="utf-8"?>
+<p:sld xmlns:a="http://schemas.openxmlformats.org/drawingml/2006/main" xmlns:r="http://schemas.openxmlformats.org/officeDocument/2006/relationships" xmlns:p="http://schemas.openxmlformats.org/presentationml/2006/main">
+  <p:cSld>
+    <p:spTree>
+      <p:nvGrpSpPr>
+        <p:cNvPr id="1" name=""/>
+        <p:cNvGrpSpPr/>
+        <p:nvPr/>
+      </p:nvGrpSpPr>
+      <p:grpSpPr>
+        <a:xfrm>
+          <a:off x="0" y="0"/>
+          <a:ext cx="0" cy="0"/>
+          <a:chOff x="0" y="0"/>
+          <a:chExt cx="0" cy="0"/>
+        </a:xfrm>
+      </p:grpSpPr>
+      <p:sp>
+        <p:nvSpPr>
+          <p:cNvPr id="3" name="TextBox 2"/>
+          <p:cNvSpPr txBox="1"/>
+          <p:nvPr/>
+        </p:nvSpPr>
+        <p:spPr>
+          <a:xfrm>
+            <a:off x="491574" y="1511162"/>
+            <a:ext cx="11342617" cy="923330"/>
+          </a:xfrm>
+          <a:prstGeom prst="rect">
+            <a:avLst/>
+          </a:prstGeom>
+          <a:noFill/>
+        </p:spPr>
+        <p:txBody>
+          <a:bodyPr wrap="square" rtlCol="0">
+            <a:spAutoFit/>
+          </a:bodyPr>
+          <a:lstStyle/>
+          <a:p>
+            <a:pPr algn="ctr"/>
+            <a:r>
+              <a:rPr lang="en-IN" sz="5400" b="1" dirty="0">
+                <a:latin typeface="Verdana" panose="020B0604030504040204" pitchFamily="34" charset="0"/>
+                <a:ea typeface="Verdana" panose="020B0604030504040204" pitchFamily="34" charset="0"/>
+                <a:cs typeface="Verdana" panose="020B0604030504040204" pitchFamily="34" charset="0"/>
+              </a:rPr>
+              <a:t>Forms</a:t>
+            </a:r>
+          </a:p>
+        </p:txBody>
+      </p:sp>
+    </p:spTree>
+    <p:extLst>
+      <p:ext uri="{BB962C8B-B14F-4D97-AF65-F5344CB8AC3E}">
+        <p14:creationId xmlns:p14="http://schemas.microsoft.com/office/powerpoint/2010/main" val="57724120"/>
+      </p:ext>
+    </p:extLst>
+  </p:cSld>
+  <p:clrMapOvr>
+    <a:masterClrMapping/>
+  </p:clrMapOvr>
+</p:sld>
+</file>
+
+<file path=ppt/slides/slide77.xml><?xml version="1.0" encoding="utf-8"?>
+<p:sld xmlns:a="http://schemas.openxmlformats.org/drawingml/2006/main" xmlns:r="http://schemas.openxmlformats.org/officeDocument/2006/relationships" xmlns:p="http://schemas.openxmlformats.org/presentationml/2006/main">
+  <p:cSld>
+    <p:spTree>
+      <p:nvGrpSpPr>
+        <p:cNvPr id="1" name=""/>
+        <p:cNvGrpSpPr/>
+        <p:nvPr/>
+      </p:nvGrpSpPr>
+      <p:grpSpPr>
+        <a:xfrm>
+          <a:off x="0" y="0"/>
+          <a:ext cx="0" cy="0"/>
+          <a:chOff x="0" y="0"/>
+          <a:chExt cx="0" cy="0"/>
+        </a:xfrm>
+      </p:grpSpPr>
+    </p:spTree>
+    <p:extLst>
+      <p:ext uri="{BB962C8B-B14F-4D97-AF65-F5344CB8AC3E}">
+        <p14:creationId xmlns:p14="http://schemas.microsoft.com/office/powerpoint/2010/main" val="3948209756"/>
       </p:ext>
     </p:extLst>
   </p:cSld>

</xml_diff>